<commit_message>
PPT / Abstrat Update
</commit_message>
<xml_diff>
--- a/PROJECT ABSTRACT & PRESENTATION/Emergency Locator.pptx
+++ b/PROJECT ABSTRACT & PRESENTATION/Emergency Locator.pptx
@@ -10,13 +10,14 @@
     <p:sldId id="257" r:id="rId4"/>
     <p:sldId id="258" r:id="rId5"/>
     <p:sldId id="260" r:id="rId6"/>
-    <p:sldId id="261" r:id="rId7"/>
-    <p:sldId id="262" r:id="rId8"/>
-    <p:sldId id="263" r:id="rId9"/>
-    <p:sldId id="264" r:id="rId10"/>
-    <p:sldId id="265" r:id="rId11"/>
-    <p:sldId id="266" r:id="rId12"/>
-    <p:sldId id="267" r:id="rId13"/>
+    <p:sldId id="268" r:id="rId7"/>
+    <p:sldId id="261" r:id="rId8"/>
+    <p:sldId id="262" r:id="rId9"/>
+    <p:sldId id="263" r:id="rId10"/>
+    <p:sldId id="264" r:id="rId11"/>
+    <p:sldId id="265" r:id="rId12"/>
+    <p:sldId id="266" r:id="rId13"/>
+    <p:sldId id="267" r:id="rId14"/>
   </p:sldIdLst>
   <p:sldSz cx="12192000" cy="6858000"/>
   <p:notesSz cx="6858000" cy="9144000"/>
@@ -5829,7 +5830,35 @@
           <a:p>
             <a:r>
               <a:rPr lang="en-IN" dirty="0" smtClean="0"/>
-              <a:t>Because Life Is Important!!</a:t>
+              <a:t>Because </a:t>
+            </a:r>
+            <a:r>
+              <a:rPr lang="en-IN" dirty="0" smtClean="0"/>
+              <a:t>“</a:t>
+            </a:r>
+            <a:r>
+              <a:rPr lang="en-IN" dirty="0" err="1" smtClean="0"/>
+              <a:t>Zindagi</a:t>
+            </a:r>
+            <a:r>
+              <a:rPr lang="en-IN" dirty="0" smtClean="0"/>
+              <a:t> Na </a:t>
+            </a:r>
+            <a:r>
+              <a:rPr lang="en-IN" dirty="0" err="1" smtClean="0"/>
+              <a:t>Milegi</a:t>
+            </a:r>
+            <a:r>
+              <a:rPr lang="en-IN" dirty="0" smtClean="0"/>
+              <a:t> </a:t>
+            </a:r>
+            <a:r>
+              <a:rPr lang="en-IN" dirty="0" err="1" smtClean="0"/>
+              <a:t>Doobara</a:t>
+            </a:r>
+            <a:r>
+              <a:rPr lang="en-IN" dirty="0" smtClean="0"/>
+              <a:t>” !!</a:t>
             </a:r>
             <a:endParaRPr lang="en-IN" dirty="0"/>
           </a:p>
@@ -6158,10 +6187,14 @@
           <a:lstStyle/>
           <a:p>
             <a:r>
-              <a:rPr lang="en-IN" sz="6000" dirty="0" smtClean="0"/>
-              <a:t>Donate :-</a:t>
-            </a:r>
-            <a:endParaRPr lang="en-IN" sz="6000" dirty="0"/>
+              <a:rPr lang="en-IN" sz="5400" dirty="0" smtClean="0"/>
+              <a:t>Search Relief </a:t>
+            </a:r>
+            <a:r>
+              <a:rPr lang="en-IN" sz="5400" dirty="0" err="1" smtClean="0"/>
+              <a:t>Centers</a:t>
+            </a:r>
+            <a:endParaRPr lang="en-IN" sz="5400" dirty="0"/>
           </a:p>
         </p:txBody>
       </p:sp>
@@ -6177,23 +6210,50 @@
         </p:nvSpPr>
         <p:spPr/>
         <p:txBody>
-          <a:bodyPr>
-            <a:normAutofit/>
-          </a:bodyPr>
+          <a:bodyPr/>
           <a:lstStyle/>
           <a:p>
             <a:r>
               <a:rPr lang="en-IN" sz="2800" dirty="0" smtClean="0"/>
-              <a:t>As it is said “Doing Good Deed Is Man’s Most Glorious Task”. Do some good by donating something to help those in need. Be it your electronic items or clothes or a small amount of money.</a:t>
-            </a:r>
-            <a:endParaRPr lang="en-IN" sz="2800" dirty="0"/>
+              <a:t>Struck somewhere in Disaster hit area ? Don’t know where to go? Check out Relief </a:t>
+            </a:r>
+            <a:r>
+              <a:rPr lang="en-IN" sz="2800" dirty="0" err="1" smtClean="0"/>
+              <a:t>Centers</a:t>
+            </a:r>
+            <a:r>
+              <a:rPr lang="en-IN" sz="2800" dirty="0" smtClean="0"/>
+              <a:t> Nearby</a:t>
+            </a:r>
+          </a:p>
+          <a:p>
+            <a:r>
+              <a:rPr lang="en-IN" sz="2800" dirty="0" smtClean="0"/>
+              <a:t>There are many people who are ready to help you, we have them listed for you. Avail the help.</a:t>
+            </a:r>
+          </a:p>
+          <a:p>
+            <a:r>
+              <a:rPr lang="en-IN" sz="2800" dirty="0" smtClean="0"/>
+              <a:t>Get Safe..</a:t>
+            </a:r>
+          </a:p>
+          <a:p>
+            <a:pPr marL="0" indent="0">
+              <a:buNone/>
+            </a:pPr>
+            <a:r>
+              <a:rPr lang="en-IN" dirty="0" smtClean="0"/>
+              <a:t>				</a:t>
+            </a:r>
+            <a:endParaRPr lang="en-IN" dirty="0"/>
           </a:p>
         </p:txBody>
       </p:sp>
     </p:spTree>
     <p:extLst>
       <p:ext uri="{BB962C8B-B14F-4D97-AF65-F5344CB8AC3E}">
-        <p14:creationId xmlns:p14="http://schemas.microsoft.com/office/powerpoint/2010/main" val="344584535"/>
+        <p14:creationId xmlns:p14="http://schemas.microsoft.com/office/powerpoint/2010/main" val="3433766443"/>
       </p:ext>
     </p:extLst>
   </p:cSld>
@@ -6233,7 +6293,7 @@
                             </p:stCondLst>
                             <p:childTnLst>
                               <p:par>
-                                <p:cTn id="5" presetID="1" presetClass="entr" presetSubtype="0" fill="hold" grpId="0" nodeType="clickEffect">
+                                <p:cTn id="5" presetID="42" presetClass="entr" presetSubtype="0" fill="hold" grpId="0" nodeType="clickEffect">
                                   <p:stCondLst>
                                     <p:cond delay="0"/>
                                   </p:stCondLst>
@@ -6260,6 +6320,417 @@
                                         <p:strVal val="visible"/>
                                       </p:to>
                                     </p:set>
+                                    <p:animEffect transition="in" filter="fade">
+                                      <p:cBhvr>
+                                        <p:cTn id="7" dur="1000"/>
+                                        <p:tgtEl>
+                                          <p:spTgt spid="3">
+                                            <p:txEl>
+                                              <p:pRg st="0" end="0"/>
+                                            </p:txEl>
+                                          </p:spTgt>
+                                        </p:tgtEl>
+                                      </p:cBhvr>
+                                    </p:animEffect>
+                                    <p:anim calcmode="lin" valueType="num">
+                                      <p:cBhvr>
+                                        <p:cTn id="8" dur="1000" fill="hold"/>
+                                        <p:tgtEl>
+                                          <p:spTgt spid="3">
+                                            <p:txEl>
+                                              <p:pRg st="0" end="0"/>
+                                            </p:txEl>
+                                          </p:spTgt>
+                                        </p:tgtEl>
+                                        <p:attrNameLst>
+                                          <p:attrName>ppt_x</p:attrName>
+                                        </p:attrNameLst>
+                                      </p:cBhvr>
+                                      <p:tavLst>
+                                        <p:tav tm="0">
+                                          <p:val>
+                                            <p:strVal val="#ppt_x"/>
+                                          </p:val>
+                                        </p:tav>
+                                        <p:tav tm="100000">
+                                          <p:val>
+                                            <p:strVal val="#ppt_x"/>
+                                          </p:val>
+                                        </p:tav>
+                                      </p:tavLst>
+                                    </p:anim>
+                                    <p:anim calcmode="lin" valueType="num">
+                                      <p:cBhvr>
+                                        <p:cTn id="9" dur="1000" fill="hold"/>
+                                        <p:tgtEl>
+                                          <p:spTgt spid="3">
+                                            <p:txEl>
+                                              <p:pRg st="0" end="0"/>
+                                            </p:txEl>
+                                          </p:spTgt>
+                                        </p:tgtEl>
+                                        <p:attrNameLst>
+                                          <p:attrName>ppt_y</p:attrName>
+                                        </p:attrNameLst>
+                                      </p:cBhvr>
+                                      <p:tavLst>
+                                        <p:tav tm="0">
+                                          <p:val>
+                                            <p:strVal val="#ppt_y+.1"/>
+                                          </p:val>
+                                        </p:tav>
+                                        <p:tav tm="100000">
+                                          <p:val>
+                                            <p:strVal val="#ppt_y"/>
+                                          </p:val>
+                                        </p:tav>
+                                      </p:tavLst>
+                                    </p:anim>
+                                  </p:childTnLst>
+                                </p:cTn>
+                              </p:par>
+                            </p:childTnLst>
+                          </p:cTn>
+                        </p:par>
+                      </p:childTnLst>
+                    </p:cTn>
+                  </p:par>
+                  <p:par>
+                    <p:cTn id="10" fill="hold">
+                      <p:stCondLst>
+                        <p:cond delay="indefinite"/>
+                      </p:stCondLst>
+                      <p:childTnLst>
+                        <p:par>
+                          <p:cTn id="11" fill="hold">
+                            <p:stCondLst>
+                              <p:cond delay="0"/>
+                            </p:stCondLst>
+                            <p:childTnLst>
+                              <p:par>
+                                <p:cTn id="12" presetID="42" presetClass="entr" presetSubtype="0" fill="hold" grpId="0" nodeType="clickEffect">
+                                  <p:stCondLst>
+                                    <p:cond delay="0"/>
+                                  </p:stCondLst>
+                                  <p:childTnLst>
+                                    <p:set>
+                                      <p:cBhvr>
+                                        <p:cTn id="13" dur="1" fill="hold">
+                                          <p:stCondLst>
+                                            <p:cond delay="0"/>
+                                          </p:stCondLst>
+                                        </p:cTn>
+                                        <p:tgtEl>
+                                          <p:spTgt spid="3">
+                                            <p:txEl>
+                                              <p:pRg st="1" end="1"/>
+                                            </p:txEl>
+                                          </p:spTgt>
+                                        </p:tgtEl>
+                                        <p:attrNameLst>
+                                          <p:attrName>style.visibility</p:attrName>
+                                        </p:attrNameLst>
+                                      </p:cBhvr>
+                                      <p:to>
+                                        <p:strVal val="visible"/>
+                                      </p:to>
+                                    </p:set>
+                                    <p:animEffect transition="in" filter="fade">
+                                      <p:cBhvr>
+                                        <p:cTn id="14" dur="1000"/>
+                                        <p:tgtEl>
+                                          <p:spTgt spid="3">
+                                            <p:txEl>
+                                              <p:pRg st="1" end="1"/>
+                                            </p:txEl>
+                                          </p:spTgt>
+                                        </p:tgtEl>
+                                      </p:cBhvr>
+                                    </p:animEffect>
+                                    <p:anim calcmode="lin" valueType="num">
+                                      <p:cBhvr>
+                                        <p:cTn id="15" dur="1000" fill="hold"/>
+                                        <p:tgtEl>
+                                          <p:spTgt spid="3">
+                                            <p:txEl>
+                                              <p:pRg st="1" end="1"/>
+                                            </p:txEl>
+                                          </p:spTgt>
+                                        </p:tgtEl>
+                                        <p:attrNameLst>
+                                          <p:attrName>ppt_x</p:attrName>
+                                        </p:attrNameLst>
+                                      </p:cBhvr>
+                                      <p:tavLst>
+                                        <p:tav tm="0">
+                                          <p:val>
+                                            <p:strVal val="#ppt_x"/>
+                                          </p:val>
+                                        </p:tav>
+                                        <p:tav tm="100000">
+                                          <p:val>
+                                            <p:strVal val="#ppt_x"/>
+                                          </p:val>
+                                        </p:tav>
+                                      </p:tavLst>
+                                    </p:anim>
+                                    <p:anim calcmode="lin" valueType="num">
+                                      <p:cBhvr>
+                                        <p:cTn id="16" dur="1000" fill="hold"/>
+                                        <p:tgtEl>
+                                          <p:spTgt spid="3">
+                                            <p:txEl>
+                                              <p:pRg st="1" end="1"/>
+                                            </p:txEl>
+                                          </p:spTgt>
+                                        </p:tgtEl>
+                                        <p:attrNameLst>
+                                          <p:attrName>ppt_y</p:attrName>
+                                        </p:attrNameLst>
+                                      </p:cBhvr>
+                                      <p:tavLst>
+                                        <p:tav tm="0">
+                                          <p:val>
+                                            <p:strVal val="#ppt_y+.1"/>
+                                          </p:val>
+                                        </p:tav>
+                                        <p:tav tm="100000">
+                                          <p:val>
+                                            <p:strVal val="#ppt_y"/>
+                                          </p:val>
+                                        </p:tav>
+                                      </p:tavLst>
+                                    </p:anim>
+                                  </p:childTnLst>
+                                </p:cTn>
+                              </p:par>
+                            </p:childTnLst>
+                          </p:cTn>
+                        </p:par>
+                      </p:childTnLst>
+                    </p:cTn>
+                  </p:par>
+                  <p:par>
+                    <p:cTn id="17" fill="hold">
+                      <p:stCondLst>
+                        <p:cond delay="indefinite"/>
+                      </p:stCondLst>
+                      <p:childTnLst>
+                        <p:par>
+                          <p:cTn id="18" fill="hold">
+                            <p:stCondLst>
+                              <p:cond delay="0"/>
+                            </p:stCondLst>
+                            <p:childTnLst>
+                              <p:par>
+                                <p:cTn id="19" presetID="42" presetClass="entr" presetSubtype="0" fill="hold" grpId="0" nodeType="clickEffect">
+                                  <p:stCondLst>
+                                    <p:cond delay="0"/>
+                                  </p:stCondLst>
+                                  <p:childTnLst>
+                                    <p:set>
+                                      <p:cBhvr>
+                                        <p:cTn id="20" dur="1" fill="hold">
+                                          <p:stCondLst>
+                                            <p:cond delay="0"/>
+                                          </p:stCondLst>
+                                        </p:cTn>
+                                        <p:tgtEl>
+                                          <p:spTgt spid="3">
+                                            <p:txEl>
+                                              <p:pRg st="2" end="2"/>
+                                            </p:txEl>
+                                          </p:spTgt>
+                                        </p:tgtEl>
+                                        <p:attrNameLst>
+                                          <p:attrName>style.visibility</p:attrName>
+                                        </p:attrNameLst>
+                                      </p:cBhvr>
+                                      <p:to>
+                                        <p:strVal val="visible"/>
+                                      </p:to>
+                                    </p:set>
+                                    <p:animEffect transition="in" filter="fade">
+                                      <p:cBhvr>
+                                        <p:cTn id="21" dur="1000"/>
+                                        <p:tgtEl>
+                                          <p:spTgt spid="3">
+                                            <p:txEl>
+                                              <p:pRg st="2" end="2"/>
+                                            </p:txEl>
+                                          </p:spTgt>
+                                        </p:tgtEl>
+                                      </p:cBhvr>
+                                    </p:animEffect>
+                                    <p:anim calcmode="lin" valueType="num">
+                                      <p:cBhvr>
+                                        <p:cTn id="22" dur="1000" fill="hold"/>
+                                        <p:tgtEl>
+                                          <p:spTgt spid="3">
+                                            <p:txEl>
+                                              <p:pRg st="2" end="2"/>
+                                            </p:txEl>
+                                          </p:spTgt>
+                                        </p:tgtEl>
+                                        <p:attrNameLst>
+                                          <p:attrName>ppt_x</p:attrName>
+                                        </p:attrNameLst>
+                                      </p:cBhvr>
+                                      <p:tavLst>
+                                        <p:tav tm="0">
+                                          <p:val>
+                                            <p:strVal val="#ppt_x"/>
+                                          </p:val>
+                                        </p:tav>
+                                        <p:tav tm="100000">
+                                          <p:val>
+                                            <p:strVal val="#ppt_x"/>
+                                          </p:val>
+                                        </p:tav>
+                                      </p:tavLst>
+                                    </p:anim>
+                                    <p:anim calcmode="lin" valueType="num">
+                                      <p:cBhvr>
+                                        <p:cTn id="23" dur="1000" fill="hold"/>
+                                        <p:tgtEl>
+                                          <p:spTgt spid="3">
+                                            <p:txEl>
+                                              <p:pRg st="2" end="2"/>
+                                            </p:txEl>
+                                          </p:spTgt>
+                                        </p:tgtEl>
+                                        <p:attrNameLst>
+                                          <p:attrName>ppt_y</p:attrName>
+                                        </p:attrNameLst>
+                                      </p:cBhvr>
+                                      <p:tavLst>
+                                        <p:tav tm="0">
+                                          <p:val>
+                                            <p:strVal val="#ppt_y+.1"/>
+                                          </p:val>
+                                        </p:tav>
+                                        <p:tav tm="100000">
+                                          <p:val>
+                                            <p:strVal val="#ppt_y"/>
+                                          </p:val>
+                                        </p:tav>
+                                      </p:tavLst>
+                                    </p:anim>
+                                  </p:childTnLst>
+                                </p:cTn>
+                              </p:par>
+                            </p:childTnLst>
+                          </p:cTn>
+                        </p:par>
+                      </p:childTnLst>
+                    </p:cTn>
+                  </p:par>
+                  <p:par>
+                    <p:cTn id="24" fill="hold">
+                      <p:stCondLst>
+                        <p:cond delay="indefinite"/>
+                      </p:stCondLst>
+                      <p:childTnLst>
+                        <p:par>
+                          <p:cTn id="25" fill="hold">
+                            <p:stCondLst>
+                              <p:cond delay="0"/>
+                            </p:stCondLst>
+                            <p:childTnLst>
+                              <p:par>
+                                <p:cTn id="26" presetID="42" presetClass="entr" presetSubtype="0" fill="hold" grpId="0" nodeType="clickEffect">
+                                  <p:stCondLst>
+                                    <p:cond delay="0"/>
+                                  </p:stCondLst>
+                                  <p:childTnLst>
+                                    <p:set>
+                                      <p:cBhvr>
+                                        <p:cTn id="27" dur="1" fill="hold">
+                                          <p:stCondLst>
+                                            <p:cond delay="0"/>
+                                          </p:stCondLst>
+                                        </p:cTn>
+                                        <p:tgtEl>
+                                          <p:spTgt spid="3">
+                                            <p:txEl>
+                                              <p:pRg st="3" end="3"/>
+                                            </p:txEl>
+                                          </p:spTgt>
+                                        </p:tgtEl>
+                                        <p:attrNameLst>
+                                          <p:attrName>style.visibility</p:attrName>
+                                        </p:attrNameLst>
+                                      </p:cBhvr>
+                                      <p:to>
+                                        <p:strVal val="visible"/>
+                                      </p:to>
+                                    </p:set>
+                                    <p:animEffect transition="in" filter="fade">
+                                      <p:cBhvr>
+                                        <p:cTn id="28" dur="1000"/>
+                                        <p:tgtEl>
+                                          <p:spTgt spid="3">
+                                            <p:txEl>
+                                              <p:pRg st="3" end="3"/>
+                                            </p:txEl>
+                                          </p:spTgt>
+                                        </p:tgtEl>
+                                      </p:cBhvr>
+                                    </p:animEffect>
+                                    <p:anim calcmode="lin" valueType="num">
+                                      <p:cBhvr>
+                                        <p:cTn id="29" dur="1000" fill="hold"/>
+                                        <p:tgtEl>
+                                          <p:spTgt spid="3">
+                                            <p:txEl>
+                                              <p:pRg st="3" end="3"/>
+                                            </p:txEl>
+                                          </p:spTgt>
+                                        </p:tgtEl>
+                                        <p:attrNameLst>
+                                          <p:attrName>ppt_x</p:attrName>
+                                        </p:attrNameLst>
+                                      </p:cBhvr>
+                                      <p:tavLst>
+                                        <p:tav tm="0">
+                                          <p:val>
+                                            <p:strVal val="#ppt_x"/>
+                                          </p:val>
+                                        </p:tav>
+                                        <p:tav tm="100000">
+                                          <p:val>
+                                            <p:strVal val="#ppt_x"/>
+                                          </p:val>
+                                        </p:tav>
+                                      </p:tavLst>
+                                    </p:anim>
+                                    <p:anim calcmode="lin" valueType="num">
+                                      <p:cBhvr>
+                                        <p:cTn id="30" dur="1000" fill="hold"/>
+                                        <p:tgtEl>
+                                          <p:spTgt spid="3">
+                                            <p:txEl>
+                                              <p:pRg st="3" end="3"/>
+                                            </p:txEl>
+                                          </p:spTgt>
+                                        </p:tgtEl>
+                                        <p:attrNameLst>
+                                          <p:attrName>ppt_y</p:attrName>
+                                        </p:attrNameLst>
+                                      </p:cBhvr>
+                                      <p:tavLst>
+                                        <p:tav tm="0">
+                                          <p:val>
+                                            <p:strVal val="#ppt_y+.1"/>
+                                          </p:val>
+                                        </p:tav>
+                                        <p:tav tm="100000">
+                                          <p:val>
+                                            <p:strVal val="#ppt_y"/>
+                                          </p:val>
+                                        </p:tav>
+                                      </p:tavLst>
+                                    </p:anim>
                                   </p:childTnLst>
                                 </p:cTn>
                               </p:par>
@@ -6333,6 +6804,180 @@
           <a:p>
             <a:r>
               <a:rPr lang="en-IN" sz="6000" dirty="0" smtClean="0"/>
+              <a:t>Donate :-</a:t>
+            </a:r>
+            <a:endParaRPr lang="en-IN" sz="6000" dirty="0"/>
+          </a:p>
+        </p:txBody>
+      </p:sp>
+      <p:sp>
+        <p:nvSpPr>
+          <p:cNvPr id="3" name="Content Placeholder 2"/>
+          <p:cNvSpPr>
+            <a:spLocks noGrp="1"/>
+          </p:cNvSpPr>
+          <p:nvPr>
+            <p:ph idx="1"/>
+          </p:nvPr>
+        </p:nvSpPr>
+        <p:spPr/>
+        <p:txBody>
+          <a:bodyPr>
+            <a:normAutofit/>
+          </a:bodyPr>
+          <a:lstStyle/>
+          <a:p>
+            <a:r>
+              <a:rPr lang="en-IN" sz="2800" dirty="0" smtClean="0"/>
+              <a:t>As it is said “Doing Good Deed Is Man’s Most Glorious Task”. Do some good by donating something to help those in need. Be it your electronic items or clothes or a small amount of money.</a:t>
+            </a:r>
+            <a:endParaRPr lang="en-IN" sz="2800" dirty="0"/>
+          </a:p>
+        </p:txBody>
+      </p:sp>
+    </p:spTree>
+    <p:extLst>
+      <p:ext uri="{BB962C8B-B14F-4D97-AF65-F5344CB8AC3E}">
+        <p14:creationId xmlns:p14="http://schemas.microsoft.com/office/powerpoint/2010/main" val="344584535"/>
+      </p:ext>
+    </p:extLst>
+  </p:cSld>
+  <p:clrMapOvr>
+    <a:masterClrMapping/>
+  </p:clrMapOvr>
+  <mc:AlternateContent xmlns:mc="http://schemas.openxmlformats.org/markup-compatibility/2006" xmlns:p14="http://schemas.microsoft.com/office/powerpoint/2010/main">
+    <mc:Choice Requires="p14">
+      <p:transition spd="slow" p14:dur="1300">
+        <p14:pan dir="u"/>
+      </p:transition>
+    </mc:Choice>
+    <mc:Fallback xmlns="">
+      <p:transition spd="slow">
+        <p:fade/>
+      </p:transition>
+    </mc:Fallback>
+  </mc:AlternateContent>
+  <p:timing>
+    <p:tnLst>
+      <p:par>
+        <p:cTn id="1" dur="indefinite" restart="never" nodeType="tmRoot">
+          <p:childTnLst>
+            <p:seq concurrent="1" nextAc="seek">
+              <p:cTn id="2" dur="indefinite" nodeType="mainSeq">
+                <p:childTnLst>
+                  <p:par>
+                    <p:cTn id="3" fill="hold">
+                      <p:stCondLst>
+                        <p:cond delay="indefinite"/>
+                      </p:stCondLst>
+                      <p:childTnLst>
+                        <p:par>
+                          <p:cTn id="4" fill="hold">
+                            <p:stCondLst>
+                              <p:cond delay="0"/>
+                            </p:stCondLst>
+                            <p:childTnLst>
+                              <p:par>
+                                <p:cTn id="5" presetID="1" presetClass="entr" presetSubtype="0" fill="hold" grpId="0" nodeType="clickEffect">
+                                  <p:stCondLst>
+                                    <p:cond delay="0"/>
+                                  </p:stCondLst>
+                                  <p:childTnLst>
+                                    <p:set>
+                                      <p:cBhvr>
+                                        <p:cTn id="6" dur="1" fill="hold">
+                                          <p:stCondLst>
+                                            <p:cond delay="0"/>
+                                          </p:stCondLst>
+                                        </p:cTn>
+                                        <p:tgtEl>
+                                          <p:spTgt spid="3">
+                                            <p:txEl>
+                                              <p:pRg st="0" end="0"/>
+                                            </p:txEl>
+                                          </p:spTgt>
+                                        </p:tgtEl>
+                                        <p:attrNameLst>
+                                          <p:attrName>style.visibility</p:attrName>
+                                        </p:attrNameLst>
+                                      </p:cBhvr>
+                                      <p:to>
+                                        <p:strVal val="visible"/>
+                                      </p:to>
+                                    </p:set>
+                                  </p:childTnLst>
+                                </p:cTn>
+                              </p:par>
+                            </p:childTnLst>
+                          </p:cTn>
+                        </p:par>
+                      </p:childTnLst>
+                    </p:cTn>
+                  </p:par>
+                </p:childTnLst>
+              </p:cTn>
+              <p:prevCondLst>
+                <p:cond evt="onPrev" delay="0">
+                  <p:tgtEl>
+                    <p:sldTgt/>
+                  </p:tgtEl>
+                </p:cond>
+              </p:prevCondLst>
+              <p:nextCondLst>
+                <p:cond evt="onNext" delay="0">
+                  <p:tgtEl>
+                    <p:sldTgt/>
+                  </p:tgtEl>
+                </p:cond>
+              </p:nextCondLst>
+            </p:seq>
+          </p:childTnLst>
+        </p:cTn>
+      </p:par>
+    </p:tnLst>
+    <p:bldLst>
+      <p:bldP spid="3" grpId="0" build="p"/>
+    </p:bldLst>
+  </p:timing>
+</p:sld>
+</file>
+
+<file path=ppt/slides/slide12.xml><?xml version="1.0" encoding="utf-8"?>
+<p:sld xmlns:a="http://schemas.openxmlformats.org/drawingml/2006/main" xmlns:r="http://schemas.openxmlformats.org/officeDocument/2006/relationships" xmlns:p="http://schemas.openxmlformats.org/presentationml/2006/main">
+  <p:cSld>
+    <p:spTree>
+      <p:nvGrpSpPr>
+        <p:cNvPr id="1" name=""/>
+        <p:cNvGrpSpPr/>
+        <p:nvPr/>
+      </p:nvGrpSpPr>
+      <p:grpSpPr>
+        <a:xfrm>
+          <a:off x="0" y="0"/>
+          <a:ext cx="0" cy="0"/>
+          <a:chOff x="0" y="0"/>
+          <a:chExt cx="0" cy="0"/>
+        </a:xfrm>
+      </p:grpSpPr>
+      <p:sp>
+        <p:nvSpPr>
+          <p:cNvPr id="2" name="Title 1"/>
+          <p:cNvSpPr>
+            <a:spLocks noGrp="1"/>
+          </p:cNvSpPr>
+          <p:nvPr>
+            <p:ph type="title"/>
+          </p:nvPr>
+        </p:nvSpPr>
+        <p:spPr/>
+        <p:txBody>
+          <a:bodyPr>
+            <a:normAutofit/>
+          </a:bodyPr>
+          <a:lstStyle/>
+          <a:p>
+            <a:r>
+              <a:rPr lang="en-IN" sz="6000" dirty="0" smtClean="0"/>
               <a:t>SOS :- </a:t>
             </a:r>
             <a:endParaRPr lang="en-IN" sz="6000" dirty="0"/>
@@ -6389,12 +7034,16 @@
               <a:t>If struck somewhere badly and no one is to help you. Send an SMS to </a:t>
             </a:r>
             <a:r>
-              <a:rPr lang="en-IN" sz="2400" smtClean="0"/>
+              <a:rPr lang="en-IN" sz="2400" dirty="0" smtClean="0"/>
               <a:t>+</a:t>
             </a:r>
             <a:r>
-              <a:rPr lang="en-IN" sz="2400" smtClean="0"/>
-              <a:t>1 256-515-4691 </a:t>
+              <a:rPr lang="en-IN" sz="2400" dirty="0" smtClean="0"/>
+              <a:t>44 7400 077979</a:t>
+            </a:r>
+            <a:r>
+              <a:rPr lang="en-IN" sz="2400" dirty="0" smtClean="0"/>
+              <a:t> </a:t>
             </a:r>
             <a:r>
               <a:rPr lang="en-IN" sz="2400" dirty="0" smtClean="0"/>
@@ -6411,13 +7060,12 @@
             </a:r>
             <a:r>
               <a:rPr lang="en-IN" sz="2400" dirty="0" smtClean="0"/>
-              <a:t>&lt;Name&gt; </a:t>
+              <a:t>RELIEF &lt;PIN Code&gt; &lt;</a:t>
             </a:r>
             <a:r>
               <a:rPr lang="en-IN" sz="2400" dirty="0" smtClean="0"/>
-              <a:t>&lt;Address&gt;</a:t>
-            </a:r>
-            <a:endParaRPr lang="en-IN" sz="2400" dirty="0" smtClean="0"/>
+              <a:t>Address&gt;</a:t>
+            </a:r>
           </a:p>
           <a:p>
             <a:pPr>
@@ -8270,7 +8918,7 @@
 </p:sld>
 </file>
 
-<file path=ppt/slides/slide12.xml><?xml version="1.0" encoding="utf-8"?>
+<file path=ppt/slides/slide13.xml><?xml version="1.0" encoding="utf-8"?>
 <p:sld xmlns:a="http://schemas.openxmlformats.org/drawingml/2006/main" xmlns:r="http://schemas.openxmlformats.org/officeDocument/2006/relationships" xmlns:p="http://schemas.openxmlformats.org/presentationml/2006/main">
   <p:cSld>
     <p:spTree>
@@ -9246,32 +9894,54 @@
         </p:nvSpPr>
         <p:spPr/>
         <p:txBody>
-          <a:bodyPr/>
+          <a:bodyPr>
+            <a:normAutofit/>
+          </a:bodyPr>
           <a:lstStyle/>
           <a:p>
             <a:r>
-              <a:rPr lang="en-IN" sz="2000" dirty="0" smtClean="0"/>
+              <a:rPr lang="en-IN" dirty="0" smtClean="0"/>
               <a:t>Medicare</a:t>
             </a:r>
           </a:p>
           <a:p>
             <a:r>
-              <a:rPr lang="en-IN" sz="2000" dirty="0" smtClean="0"/>
-              <a:t>Blood Banks</a:t>
-            </a:r>
-          </a:p>
-          <a:p>
-            <a:r>
-              <a:rPr lang="en-IN" sz="2000" dirty="0" smtClean="0"/>
-              <a:t>Financial Aid</a:t>
-            </a:r>
-          </a:p>
-          <a:p>
-            <a:r>
-              <a:rPr lang="en-IN" sz="2000" dirty="0" err="1" smtClean="0"/>
+              <a:rPr lang="en-IN" dirty="0" smtClean="0"/>
+              <a:t>Blood </a:t>
+            </a:r>
+            <a:r>
+              <a:rPr lang="en-IN" dirty="0" smtClean="0"/>
+              <a:t>Banks</a:t>
+            </a:r>
+          </a:p>
+          <a:p>
+            <a:r>
+              <a:rPr lang="en-IN" dirty="0"/>
+              <a:t>Twitter Feeds Related To Recent Calamities</a:t>
+            </a:r>
+            <a:r>
+              <a:rPr lang="en-IN" dirty="0" smtClean="0"/>
+              <a:t>.</a:t>
+            </a:r>
+            <a:endParaRPr lang="en-IN" dirty="0" smtClean="0"/>
+          </a:p>
+          <a:p>
+            <a:r>
+              <a:rPr lang="en-IN" dirty="0" smtClean="0"/>
+              <a:t>Financial </a:t>
+            </a:r>
+            <a:r>
+              <a:rPr lang="en-IN" dirty="0" smtClean="0"/>
+              <a:t>Aid</a:t>
+            </a:r>
+            <a:endParaRPr lang="en-IN" dirty="0" smtClean="0"/>
+          </a:p>
+          <a:p>
+            <a:r>
+              <a:rPr lang="en-IN" dirty="0" err="1" smtClean="0"/>
               <a:t>SoS</a:t>
             </a:r>
-            <a:endParaRPr lang="en-IN" sz="2000" dirty="0" smtClean="0"/>
+            <a:endParaRPr lang="en-IN" dirty="0" smtClean="0"/>
           </a:p>
           <a:p>
             <a:pPr lvl="1">
@@ -9279,14 +9949,14 @@
               <a:buChar char="Ø"/>
             </a:pPr>
             <a:r>
-              <a:rPr lang="en-IN" sz="2000" dirty="0" smtClean="0"/>
+              <a:rPr lang="en-IN" sz="1800" dirty="0" smtClean="0"/>
               <a:t>Enter Relief </a:t>
             </a:r>
             <a:r>
-              <a:rPr lang="en-IN" sz="2000" dirty="0" err="1" smtClean="0"/>
+              <a:rPr lang="en-IN" sz="1800" dirty="0" err="1" smtClean="0"/>
               <a:t>Centers</a:t>
             </a:r>
-            <a:endParaRPr lang="en-IN" sz="2000" dirty="0" smtClean="0"/>
+            <a:endParaRPr lang="en-IN" sz="1800" dirty="0" smtClean="0"/>
           </a:p>
           <a:p>
             <a:pPr lvl="1">
@@ -9294,14 +9964,14 @@
               <a:buChar char="Ø"/>
             </a:pPr>
             <a:r>
-              <a:rPr lang="en-IN" sz="2000" dirty="0" smtClean="0"/>
+              <a:rPr lang="en-IN" sz="1800" dirty="0" smtClean="0"/>
               <a:t>Search For Relief </a:t>
             </a:r>
             <a:r>
-              <a:rPr lang="en-IN" sz="2000" dirty="0" err="1" smtClean="0"/>
+              <a:rPr lang="en-IN" sz="1800" dirty="0" err="1" smtClean="0"/>
               <a:t>Centers</a:t>
             </a:r>
-            <a:endParaRPr lang="en-IN" sz="2000" dirty="0" smtClean="0"/>
+            <a:endParaRPr lang="en-IN" sz="1800" dirty="0" smtClean="0"/>
           </a:p>
           <a:p>
             <a:pPr lvl="1">
@@ -9309,7 +9979,7 @@
               <a:buChar char="Ø"/>
             </a:pPr>
             <a:r>
-              <a:rPr lang="en-IN" sz="2000" dirty="0" smtClean="0"/>
+              <a:rPr lang="en-IN" sz="1800" dirty="0" smtClean="0"/>
               <a:t>Donate </a:t>
             </a:r>
           </a:p>
@@ -9319,12 +9989,14 @@
               <a:buChar char="Ø"/>
             </a:pPr>
             <a:r>
-              <a:rPr lang="en-IN" sz="2000" dirty="0" smtClean="0"/>
-              <a:t>Help Me!!</a:t>
-            </a:r>
-          </a:p>
-          <a:p>
-            <a:endParaRPr lang="en-IN" dirty="0"/>
+              <a:rPr lang="en-IN" sz="1800" dirty="0" smtClean="0"/>
+              <a:t>Help Me</a:t>
+            </a:r>
+            <a:r>
+              <a:rPr lang="en-IN" sz="1800" dirty="0" smtClean="0"/>
+              <a:t>!!</a:t>
+            </a:r>
+            <a:endParaRPr lang="en-IN" sz="1800" dirty="0" smtClean="0"/>
           </a:p>
         </p:txBody>
       </p:sp>
@@ -9587,15 +10259,33 @@
                                   </p:childTnLst>
                                 </p:cTn>
                               </p:par>
+                            </p:childTnLst>
+                          </p:cTn>
+                        </p:par>
+                      </p:childTnLst>
+                    </p:cTn>
+                  </p:par>
+                  <p:par>
+                    <p:cTn id="23" fill="hold">
+                      <p:stCondLst>
+                        <p:cond delay="indefinite"/>
+                      </p:stCondLst>
+                      <p:childTnLst>
+                        <p:par>
+                          <p:cTn id="24" fill="hold">
+                            <p:stCondLst>
+                              <p:cond delay="0"/>
+                            </p:stCondLst>
+                            <p:childTnLst>
                               <p:par>
-                                <p:cTn id="23" presetID="2" presetClass="entr" presetSubtype="4" fill="hold" grpId="0" nodeType="withEffect">
+                                <p:cTn id="25" presetID="10" presetClass="entr" presetSubtype="0" fill="hold" grpId="0" nodeType="clickEffect">
                                   <p:stCondLst>
                                     <p:cond delay="0"/>
                                   </p:stCondLst>
                                   <p:childTnLst>
                                     <p:set>
                                       <p:cBhvr>
-                                        <p:cTn id="24" dur="1" fill="hold">
+                                        <p:cTn id="26" dur="1" fill="hold">
                                           <p:stCondLst>
                                             <p:cond delay="0"/>
                                           </p:stCondLst>
@@ -9604,6 +10294,49 @@
                                           <p:spTgt spid="3">
                                             <p:txEl>
                                               <p:pRg st="4" end="4"/>
+                                            </p:txEl>
+                                          </p:spTgt>
+                                        </p:tgtEl>
+                                        <p:attrNameLst>
+                                          <p:attrName>style.visibility</p:attrName>
+                                        </p:attrNameLst>
+                                      </p:cBhvr>
+                                      <p:to>
+                                        <p:strVal val="visible"/>
+                                      </p:to>
+                                    </p:set>
+                                    <p:animEffect transition="in" filter="fade">
+                                      <p:cBhvr>
+                                        <p:cTn id="27" dur="500"/>
+                                        <p:tgtEl>
+                                          <p:spTgt spid="3">
+                                            <p:txEl>
+                                              <p:pRg st="4" end="4"/>
+                                            </p:txEl>
+                                          </p:spTgt>
+                                        </p:tgtEl>
+                                      </p:cBhvr>
+                                    </p:animEffect>
+                                  </p:childTnLst>
+                                </p:cTn>
+                              </p:par>
+                              <p:par>
+                                <p:cTn id="28" presetID="2" presetClass="entr" presetSubtype="4" fill="hold" grpId="0" nodeType="withEffect">
+                                  <p:stCondLst>
+                                    <p:cond delay="0"/>
+                                  </p:stCondLst>
+                                  <p:childTnLst>
+                                    <p:set>
+                                      <p:cBhvr>
+                                        <p:cTn id="29" dur="1" fill="hold">
+                                          <p:stCondLst>
+                                            <p:cond delay="0"/>
+                                          </p:stCondLst>
+                                        </p:cTn>
+                                        <p:tgtEl>
+                                          <p:spTgt spid="3">
+                                            <p:txEl>
+                                              <p:pRg st="5" end="5"/>
                                             </p:txEl>
                                           </p:spTgt>
                                         </p:tgtEl>
@@ -9617,11 +10350,11 @@
                                     </p:set>
                                     <p:anim calcmode="lin" valueType="num">
                                       <p:cBhvr additive="base">
-                                        <p:cTn id="25" dur="500" fill="hold"/>
-                                        <p:tgtEl>
-                                          <p:spTgt spid="3">
-                                            <p:txEl>
-                                              <p:pRg st="4" end="4"/>
+                                        <p:cTn id="30" dur="500" fill="hold"/>
+                                        <p:tgtEl>
+                                          <p:spTgt spid="3">
+                                            <p:txEl>
+                                              <p:pRg st="5" end="5"/>
                                             </p:txEl>
                                           </p:spTgt>
                                         </p:tgtEl>
@@ -9644,11 +10377,11 @@
                                     </p:anim>
                                     <p:anim calcmode="lin" valueType="num">
                                       <p:cBhvr additive="base">
-                                        <p:cTn id="26" dur="500" fill="hold"/>
-                                        <p:tgtEl>
-                                          <p:spTgt spid="3">
-                                            <p:txEl>
-                                              <p:pRg st="4" end="4"/>
+                                        <p:cTn id="31" dur="500" fill="hold"/>
+                                        <p:tgtEl>
+                                          <p:spTgt spid="3">
+                                            <p:txEl>
+                                              <p:pRg st="5" end="5"/>
                                             </p:txEl>
                                           </p:spTgt>
                                         </p:tgtEl>
@@ -9673,14 +10406,14 @@
                                 </p:cTn>
                               </p:par>
                               <p:par>
-                                <p:cTn id="27" presetID="2" presetClass="entr" presetSubtype="4" fill="hold" grpId="0" nodeType="withEffect">
+                                <p:cTn id="32" presetID="2" presetClass="entr" presetSubtype="4" fill="hold" grpId="0" nodeType="withEffect">
                                   <p:stCondLst>
                                     <p:cond delay="0"/>
                                   </p:stCondLst>
                                   <p:childTnLst>
                                     <p:set>
                                       <p:cBhvr>
-                                        <p:cTn id="28" dur="1" fill="hold">
+                                        <p:cTn id="33" dur="1" fill="hold">
                                           <p:stCondLst>
                                             <p:cond delay="0"/>
                                           </p:stCondLst>
@@ -9688,7 +10421,7 @@
                                         <p:tgtEl>
                                           <p:spTgt spid="3">
                                             <p:txEl>
-                                              <p:pRg st="5" end="5"/>
+                                              <p:pRg st="6" end="6"/>
                                             </p:txEl>
                                           </p:spTgt>
                                         </p:tgtEl>
@@ -9702,11 +10435,11 @@
                                     </p:set>
                                     <p:anim calcmode="lin" valueType="num">
                                       <p:cBhvr additive="base">
-                                        <p:cTn id="29" dur="500" fill="hold"/>
-                                        <p:tgtEl>
-                                          <p:spTgt spid="3">
-                                            <p:txEl>
-                                              <p:pRg st="5" end="5"/>
+                                        <p:cTn id="34" dur="500" fill="hold"/>
+                                        <p:tgtEl>
+                                          <p:spTgt spid="3">
+                                            <p:txEl>
+                                              <p:pRg st="6" end="6"/>
                                             </p:txEl>
                                           </p:spTgt>
                                         </p:tgtEl>
@@ -9729,11 +10462,11 @@
                                     </p:anim>
                                     <p:anim calcmode="lin" valueType="num">
                                       <p:cBhvr additive="base">
-                                        <p:cTn id="30" dur="500" fill="hold"/>
-                                        <p:tgtEl>
-                                          <p:spTgt spid="3">
-                                            <p:txEl>
-                                              <p:pRg st="5" end="5"/>
+                                        <p:cTn id="35" dur="500" fill="hold"/>
+                                        <p:tgtEl>
+                                          <p:spTgt spid="3">
+                                            <p:txEl>
+                                              <p:pRg st="6" end="6"/>
                                             </p:txEl>
                                           </p:spTgt>
                                         </p:tgtEl>
@@ -9758,14 +10491,14 @@
                                 </p:cTn>
                               </p:par>
                               <p:par>
-                                <p:cTn id="31" presetID="2" presetClass="entr" presetSubtype="4" fill="hold" grpId="0" nodeType="withEffect">
+                                <p:cTn id="36" presetID="2" presetClass="entr" presetSubtype="4" fill="hold" grpId="0" nodeType="withEffect">
                                   <p:stCondLst>
                                     <p:cond delay="0"/>
                                   </p:stCondLst>
                                   <p:childTnLst>
                                     <p:set>
                                       <p:cBhvr>
-                                        <p:cTn id="32" dur="1" fill="hold">
+                                        <p:cTn id="37" dur="1" fill="hold">
                                           <p:stCondLst>
                                             <p:cond delay="0"/>
                                           </p:stCondLst>
@@ -9773,7 +10506,7 @@
                                         <p:tgtEl>
                                           <p:spTgt spid="3">
                                             <p:txEl>
-                                              <p:pRg st="6" end="6"/>
+                                              <p:pRg st="7" end="7"/>
                                             </p:txEl>
                                           </p:spTgt>
                                         </p:tgtEl>
@@ -9787,11 +10520,11 @@
                                     </p:set>
                                     <p:anim calcmode="lin" valueType="num">
                                       <p:cBhvr additive="base">
-                                        <p:cTn id="33" dur="500" fill="hold"/>
-                                        <p:tgtEl>
-                                          <p:spTgt spid="3">
-                                            <p:txEl>
-                                              <p:pRg st="6" end="6"/>
+                                        <p:cTn id="38" dur="500" fill="hold"/>
+                                        <p:tgtEl>
+                                          <p:spTgt spid="3">
+                                            <p:txEl>
+                                              <p:pRg st="7" end="7"/>
                                             </p:txEl>
                                           </p:spTgt>
                                         </p:tgtEl>
@@ -9814,11 +10547,11 @@
                                     </p:anim>
                                     <p:anim calcmode="lin" valueType="num">
                                       <p:cBhvr additive="base">
-                                        <p:cTn id="34" dur="500" fill="hold"/>
-                                        <p:tgtEl>
-                                          <p:spTgt spid="3">
-                                            <p:txEl>
-                                              <p:pRg st="6" end="6"/>
+                                        <p:cTn id="39" dur="500" fill="hold"/>
+                                        <p:tgtEl>
+                                          <p:spTgt spid="3">
+                                            <p:txEl>
+                                              <p:pRg st="7" end="7"/>
                                             </p:txEl>
                                           </p:spTgt>
                                         </p:tgtEl>
@@ -9843,14 +10576,14 @@
                                 </p:cTn>
                               </p:par>
                               <p:par>
-                                <p:cTn id="35" presetID="2" presetClass="entr" presetSubtype="4" fill="hold" grpId="0" nodeType="withEffect">
+                                <p:cTn id="40" presetID="2" presetClass="entr" presetSubtype="4" fill="hold" grpId="0" nodeType="withEffect">
                                   <p:stCondLst>
                                     <p:cond delay="0"/>
                                   </p:stCondLst>
                                   <p:childTnLst>
                                     <p:set>
                                       <p:cBhvr>
-                                        <p:cTn id="36" dur="1" fill="hold">
+                                        <p:cTn id="41" dur="1" fill="hold">
                                           <p:stCondLst>
                                             <p:cond delay="0"/>
                                           </p:stCondLst>
@@ -9858,7 +10591,7 @@
                                         <p:tgtEl>
                                           <p:spTgt spid="3">
                                             <p:txEl>
-                                              <p:pRg st="7" end="7"/>
+                                              <p:pRg st="8" end="8"/>
                                             </p:txEl>
                                           </p:spTgt>
                                         </p:tgtEl>
@@ -9872,11 +10605,11 @@
                                     </p:set>
                                     <p:anim calcmode="lin" valueType="num">
                                       <p:cBhvr additive="base">
-                                        <p:cTn id="37" dur="500" fill="hold"/>
-                                        <p:tgtEl>
-                                          <p:spTgt spid="3">
-                                            <p:txEl>
-                                              <p:pRg st="7" end="7"/>
+                                        <p:cTn id="42" dur="500" fill="hold"/>
+                                        <p:tgtEl>
+                                          <p:spTgt spid="3">
+                                            <p:txEl>
+                                              <p:pRg st="8" end="8"/>
                                             </p:txEl>
                                           </p:spTgt>
                                         </p:tgtEl>
@@ -9899,11 +10632,11 @@
                                     </p:anim>
                                     <p:anim calcmode="lin" valueType="num">
                                       <p:cBhvr additive="base">
-                                        <p:cTn id="38" dur="500" fill="hold"/>
-                                        <p:tgtEl>
-                                          <p:spTgt spid="3">
-                                            <p:txEl>
-                                              <p:pRg st="7" end="7"/>
+                                        <p:cTn id="43" dur="500" fill="hold"/>
+                                        <p:tgtEl>
+                                          <p:spTgt spid="3">
+                                            <p:txEl>
+                                              <p:pRg st="8" end="8"/>
                                             </p:txEl>
                                           </p:spTgt>
                                         </p:tgtEl>
@@ -11061,6 +11794,901 @@
       </p:grpSpPr>
       <p:pic>
         <p:nvPicPr>
+          <p:cNvPr id="7" name="Picture 6"/>
+          <p:cNvPicPr>
+            <a:picLocks noChangeAspect="1"/>
+          </p:cNvPicPr>
+          <p:nvPr/>
+        </p:nvPicPr>
+        <p:blipFill>
+          <a:blip r:embed="rId2">
+            <a:extLst>
+              <a:ext uri="{BEBA8EAE-BF5A-486C-A8C5-ECC9F3942E4B}">
+                <a14:imgProps xmlns:a14="http://schemas.microsoft.com/office/drawing/2010/main">
+                  <a14:imgLayer r:embed="rId3">
+                    <a14:imgEffect>
+                      <a14:sharpenSoften amount="-72000"/>
+                    </a14:imgEffect>
+                    <a14:imgEffect>
+                      <a14:brightnessContrast bright="-57000"/>
+                    </a14:imgEffect>
+                  </a14:imgLayer>
+                </a14:imgProps>
+              </a:ext>
+              <a:ext uri="{28A0092B-C50C-407E-A947-70E740481C1C}">
+                <a14:useLocalDpi xmlns:a14="http://schemas.microsoft.com/office/drawing/2010/main" val="0"/>
+              </a:ext>
+            </a:extLst>
+          </a:blip>
+          <a:stretch>
+            <a:fillRect/>
+          </a:stretch>
+        </p:blipFill>
+        <p:spPr>
+          <a:xfrm>
+            <a:off x="1" y="0"/>
+            <a:ext cx="12191999" cy="7093132"/>
+          </a:xfrm>
+          <a:prstGeom prst="rect">
+            <a:avLst/>
+          </a:prstGeom>
+        </p:spPr>
+      </p:pic>
+      <p:sp>
+        <p:nvSpPr>
+          <p:cNvPr id="5" name="Title 4"/>
+          <p:cNvSpPr>
+            <a:spLocks noGrp="1"/>
+          </p:cNvSpPr>
+          <p:nvPr>
+            <p:ph type="title"/>
+          </p:nvPr>
+        </p:nvSpPr>
+        <p:spPr/>
+        <p:txBody>
+          <a:bodyPr>
+            <a:normAutofit/>
+          </a:bodyPr>
+          <a:lstStyle/>
+          <a:p>
+            <a:r>
+              <a:rPr lang="en-IN" sz="3200" dirty="0" smtClean="0">
+                <a:solidFill>
+                  <a:schemeClr val="bg1"/>
+                </a:solidFill>
+              </a:rPr>
+              <a:t>Twitter Feeds Related To Certain Calamity</a:t>
+            </a:r>
+            <a:endParaRPr lang="en-IN" sz="3200" dirty="0">
+              <a:solidFill>
+                <a:schemeClr val="bg1"/>
+              </a:solidFill>
+            </a:endParaRPr>
+          </a:p>
+        </p:txBody>
+      </p:sp>
+      <p:sp>
+        <p:nvSpPr>
+          <p:cNvPr id="6" name="Content Placeholder 5"/>
+          <p:cNvSpPr>
+            <a:spLocks noGrp="1"/>
+          </p:cNvSpPr>
+          <p:nvPr>
+            <p:ph idx="1"/>
+          </p:nvPr>
+        </p:nvSpPr>
+        <p:spPr>
+          <a:xfrm>
+            <a:off x="1057161" y="2336467"/>
+            <a:ext cx="9817164" cy="3880773"/>
+          </a:xfrm>
+        </p:spPr>
+        <p:txBody>
+          <a:bodyPr/>
+          <a:lstStyle/>
+          <a:p>
+            <a:r>
+              <a:rPr lang="en-IN" sz="2000" dirty="0">
+                <a:solidFill>
+                  <a:schemeClr val="accent2">
+                    <a:lumMod val="60000"/>
+                    <a:lumOff val="40000"/>
+                  </a:schemeClr>
+                </a:solidFill>
+              </a:rPr>
+              <a:t>We have </a:t>
+            </a:r>
+            <a:r>
+              <a:rPr lang="en-IN" sz="2000" dirty="0" smtClean="0">
+                <a:solidFill>
+                  <a:schemeClr val="accent2">
+                    <a:lumMod val="60000"/>
+                    <a:lumOff val="40000"/>
+                  </a:schemeClr>
+                </a:solidFill>
+              </a:rPr>
+              <a:t>seen </a:t>
+            </a:r>
+            <a:r>
+              <a:rPr lang="en-IN" sz="2000" dirty="0">
+                <a:solidFill>
+                  <a:schemeClr val="accent2">
+                    <a:lumMod val="60000"/>
+                    <a:lumOff val="40000"/>
+                  </a:schemeClr>
+                </a:solidFill>
+              </a:rPr>
+              <a:t>that there is potential to use social media data from community members to help identify hotspots in need of </a:t>
+            </a:r>
+            <a:r>
+              <a:rPr lang="en-IN" sz="2000" dirty="0" smtClean="0">
+                <a:solidFill>
+                  <a:schemeClr val="accent2">
+                    <a:lumMod val="60000"/>
+                    <a:lumOff val="40000"/>
+                  </a:schemeClr>
+                </a:solidFill>
+              </a:rPr>
+              <a:t>aid.</a:t>
+            </a:r>
+          </a:p>
+          <a:p>
+            <a:r>
+              <a:rPr lang="en-IN" sz="2000" dirty="0" smtClean="0">
+                <a:solidFill>
+                  <a:schemeClr val="accent2">
+                    <a:lumMod val="60000"/>
+                    <a:lumOff val="40000"/>
+                  </a:schemeClr>
+                </a:solidFill>
+              </a:rPr>
+              <a:t>We Integrated twitter feed so that average people can connect to the global network and can avail social/moral/financial support that they crave for at such harsh times.</a:t>
+            </a:r>
+          </a:p>
+          <a:p>
+            <a:pPr marL="0" indent="0">
+              <a:buNone/>
+            </a:pPr>
+            <a:endParaRPr lang="en-IN" dirty="0"/>
+          </a:p>
+        </p:txBody>
+      </p:sp>
+      <p:pic>
+        <p:nvPicPr>
+          <p:cNvPr id="8" name="Picture 7"/>
+          <p:cNvPicPr>
+            <a:picLocks noChangeAspect="1"/>
+          </p:cNvPicPr>
+          <p:nvPr/>
+        </p:nvPicPr>
+        <p:blipFill>
+          <a:blip r:embed="rId4">
+            <a:extLst>
+              <a:ext uri="{BEBA8EAE-BF5A-486C-A8C5-ECC9F3942E4B}">
+                <a14:imgProps xmlns:a14="http://schemas.microsoft.com/office/drawing/2010/main">
+                  <a14:imgLayer r:embed="rId5">
+                    <a14:imgEffect>
+                      <a14:brightnessContrast bright="-17000"/>
+                    </a14:imgEffect>
+                  </a14:imgLayer>
+                </a14:imgProps>
+              </a:ext>
+              <a:ext uri="{28A0092B-C50C-407E-A947-70E740481C1C}">
+                <a14:useLocalDpi xmlns:a14="http://schemas.microsoft.com/office/drawing/2010/main" val="0"/>
+              </a:ext>
+            </a:extLst>
+          </a:blip>
+          <a:stretch>
+            <a:fillRect/>
+          </a:stretch>
+        </p:blipFill>
+        <p:spPr>
+          <a:xfrm>
+            <a:off x="185635" y="4600135"/>
+            <a:ext cx="4062808" cy="2257865"/>
+          </a:xfrm>
+          <a:prstGeom prst="rect">
+            <a:avLst/>
+          </a:prstGeom>
+        </p:spPr>
+      </p:pic>
+      <p:pic>
+        <p:nvPicPr>
+          <p:cNvPr id="10" name="Picture 9"/>
+          <p:cNvPicPr>
+            <a:picLocks noChangeAspect="1"/>
+          </p:cNvPicPr>
+          <p:nvPr/>
+        </p:nvPicPr>
+        <p:blipFill>
+          <a:blip r:embed="rId6">
+            <a:extLst>
+              <a:ext uri="{BEBA8EAE-BF5A-486C-A8C5-ECC9F3942E4B}">
+                <a14:imgProps xmlns:a14="http://schemas.microsoft.com/office/drawing/2010/main">
+                  <a14:imgLayer r:embed="rId7">
+                    <a14:imgEffect>
+                      <a14:brightnessContrast bright="-18000"/>
+                    </a14:imgEffect>
+                  </a14:imgLayer>
+                </a14:imgProps>
+              </a:ext>
+              <a:ext uri="{28A0092B-C50C-407E-A947-70E740481C1C}">
+                <a14:useLocalDpi xmlns:a14="http://schemas.microsoft.com/office/drawing/2010/main" val="0"/>
+              </a:ext>
+            </a:extLst>
+          </a:blip>
+          <a:stretch>
+            <a:fillRect/>
+          </a:stretch>
+        </p:blipFill>
+        <p:spPr>
+          <a:xfrm>
+            <a:off x="7520230" y="4763448"/>
+            <a:ext cx="4411255" cy="2074854"/>
+          </a:xfrm>
+          <a:prstGeom prst="rect">
+            <a:avLst/>
+          </a:prstGeom>
+        </p:spPr>
+      </p:pic>
+      <p:pic>
+        <p:nvPicPr>
+          <p:cNvPr id="9" name="Picture 8"/>
+          <p:cNvPicPr>
+            <a:picLocks noChangeAspect="1"/>
+          </p:cNvPicPr>
+          <p:nvPr/>
+        </p:nvPicPr>
+        <p:blipFill>
+          <a:blip r:embed="rId8">
+            <a:extLst>
+              <a:ext uri="{BEBA8EAE-BF5A-486C-A8C5-ECC9F3942E4B}">
+                <a14:imgProps xmlns:a14="http://schemas.microsoft.com/office/drawing/2010/main">
+                  <a14:imgLayer r:embed="rId9">
+                    <a14:imgEffect>
+                      <a14:brightnessContrast bright="-21000"/>
+                    </a14:imgEffect>
+                  </a14:imgLayer>
+                </a14:imgProps>
+              </a:ext>
+              <a:ext uri="{28A0092B-C50C-407E-A947-70E740481C1C}">
+                <a14:useLocalDpi xmlns:a14="http://schemas.microsoft.com/office/drawing/2010/main" val="0"/>
+              </a:ext>
+            </a:extLst>
+          </a:blip>
+          <a:stretch>
+            <a:fillRect/>
+          </a:stretch>
+        </p:blipFill>
+        <p:spPr>
+          <a:xfrm>
+            <a:off x="4032476" y="4146365"/>
+            <a:ext cx="3528908" cy="2384170"/>
+          </a:xfrm>
+          <a:prstGeom prst="rect">
+            <a:avLst/>
+          </a:prstGeom>
+        </p:spPr>
+      </p:pic>
+    </p:spTree>
+    <p:extLst>
+      <p:ext uri="{BB962C8B-B14F-4D97-AF65-F5344CB8AC3E}">
+        <p14:creationId xmlns:p14="http://schemas.microsoft.com/office/powerpoint/2010/main" val="3982424684"/>
+      </p:ext>
+    </p:extLst>
+  </p:cSld>
+  <p:clrMapOvr>
+    <a:masterClrMapping/>
+  </p:clrMapOvr>
+  <mc:AlternateContent xmlns:mc="http://schemas.openxmlformats.org/markup-compatibility/2006">
+    <mc:Choice xmlns:p14="http://schemas.microsoft.com/office/powerpoint/2010/main" Requires="p14">
+      <p:transition spd="slow" p14:dur="2000">
+        <p14:prism isContent="1"/>
+      </p:transition>
+    </mc:Choice>
+    <mc:Fallback>
+      <p:transition spd="slow">
+        <p:fade/>
+      </p:transition>
+    </mc:Fallback>
+  </mc:AlternateContent>
+  <p:timing>
+    <p:tnLst>
+      <p:par>
+        <p:cTn id="1" dur="indefinite" restart="never" nodeType="tmRoot">
+          <p:childTnLst>
+            <p:seq concurrent="1" nextAc="seek">
+              <p:cTn id="2" dur="indefinite" nodeType="mainSeq">
+                <p:childTnLst>
+                  <p:par>
+                    <p:cTn id="3" fill="hold">
+                      <p:stCondLst>
+                        <p:cond delay="indefinite"/>
+                      </p:stCondLst>
+                      <p:childTnLst>
+                        <p:par>
+                          <p:cTn id="4" fill="hold">
+                            <p:stCondLst>
+                              <p:cond delay="0"/>
+                            </p:stCondLst>
+                            <p:childTnLst>
+                              <p:par>
+                                <p:cTn id="5" presetID="42" presetClass="entr" presetSubtype="0" fill="hold" nodeType="clickEffect">
+                                  <p:stCondLst>
+                                    <p:cond delay="0"/>
+                                  </p:stCondLst>
+                                  <p:childTnLst>
+                                    <p:set>
+                                      <p:cBhvr>
+                                        <p:cTn id="6" dur="1" fill="hold">
+                                          <p:stCondLst>
+                                            <p:cond delay="0"/>
+                                          </p:stCondLst>
+                                        </p:cTn>
+                                        <p:tgtEl>
+                                          <p:spTgt spid="8"/>
+                                        </p:tgtEl>
+                                        <p:attrNameLst>
+                                          <p:attrName>style.visibility</p:attrName>
+                                        </p:attrNameLst>
+                                      </p:cBhvr>
+                                      <p:to>
+                                        <p:strVal val="visible"/>
+                                      </p:to>
+                                    </p:set>
+                                    <p:animEffect transition="in" filter="fade">
+                                      <p:cBhvr>
+                                        <p:cTn id="7" dur="1000"/>
+                                        <p:tgtEl>
+                                          <p:spTgt spid="8"/>
+                                        </p:tgtEl>
+                                      </p:cBhvr>
+                                    </p:animEffect>
+                                    <p:anim calcmode="lin" valueType="num">
+                                      <p:cBhvr>
+                                        <p:cTn id="8" dur="1000" fill="hold"/>
+                                        <p:tgtEl>
+                                          <p:spTgt spid="8"/>
+                                        </p:tgtEl>
+                                        <p:attrNameLst>
+                                          <p:attrName>ppt_x</p:attrName>
+                                        </p:attrNameLst>
+                                      </p:cBhvr>
+                                      <p:tavLst>
+                                        <p:tav tm="0">
+                                          <p:val>
+                                            <p:strVal val="#ppt_x"/>
+                                          </p:val>
+                                        </p:tav>
+                                        <p:tav tm="100000">
+                                          <p:val>
+                                            <p:strVal val="#ppt_x"/>
+                                          </p:val>
+                                        </p:tav>
+                                      </p:tavLst>
+                                    </p:anim>
+                                    <p:anim calcmode="lin" valueType="num">
+                                      <p:cBhvr>
+                                        <p:cTn id="9" dur="1000" fill="hold"/>
+                                        <p:tgtEl>
+                                          <p:spTgt spid="8"/>
+                                        </p:tgtEl>
+                                        <p:attrNameLst>
+                                          <p:attrName>ppt_y</p:attrName>
+                                        </p:attrNameLst>
+                                      </p:cBhvr>
+                                      <p:tavLst>
+                                        <p:tav tm="0">
+                                          <p:val>
+                                            <p:strVal val="#ppt_y+.1"/>
+                                          </p:val>
+                                        </p:tav>
+                                        <p:tav tm="100000">
+                                          <p:val>
+                                            <p:strVal val="#ppt_y"/>
+                                          </p:val>
+                                        </p:tav>
+                                      </p:tavLst>
+                                    </p:anim>
+                                  </p:childTnLst>
+                                </p:cTn>
+                              </p:par>
+                            </p:childTnLst>
+                          </p:cTn>
+                        </p:par>
+                      </p:childTnLst>
+                    </p:cTn>
+                  </p:par>
+                  <p:par>
+                    <p:cTn id="10" fill="hold">
+                      <p:stCondLst>
+                        <p:cond delay="indefinite"/>
+                      </p:stCondLst>
+                      <p:childTnLst>
+                        <p:par>
+                          <p:cTn id="11" fill="hold">
+                            <p:stCondLst>
+                              <p:cond delay="0"/>
+                            </p:stCondLst>
+                            <p:childTnLst>
+                              <p:par>
+                                <p:cTn id="12" presetID="31" presetClass="entr" presetSubtype="0" fill="hold" nodeType="clickEffect">
+                                  <p:stCondLst>
+                                    <p:cond delay="0"/>
+                                  </p:stCondLst>
+                                  <p:childTnLst>
+                                    <p:set>
+                                      <p:cBhvr>
+                                        <p:cTn id="13" dur="1" fill="hold">
+                                          <p:stCondLst>
+                                            <p:cond delay="0"/>
+                                          </p:stCondLst>
+                                        </p:cTn>
+                                        <p:tgtEl>
+                                          <p:spTgt spid="9"/>
+                                        </p:tgtEl>
+                                        <p:attrNameLst>
+                                          <p:attrName>style.visibility</p:attrName>
+                                        </p:attrNameLst>
+                                      </p:cBhvr>
+                                      <p:to>
+                                        <p:strVal val="visible"/>
+                                      </p:to>
+                                    </p:set>
+                                    <p:anim calcmode="lin" valueType="num">
+                                      <p:cBhvr>
+                                        <p:cTn id="14" dur="1000" fill="hold"/>
+                                        <p:tgtEl>
+                                          <p:spTgt spid="9"/>
+                                        </p:tgtEl>
+                                        <p:attrNameLst>
+                                          <p:attrName>ppt_w</p:attrName>
+                                        </p:attrNameLst>
+                                      </p:cBhvr>
+                                      <p:tavLst>
+                                        <p:tav tm="0">
+                                          <p:val>
+                                            <p:fltVal val="0"/>
+                                          </p:val>
+                                        </p:tav>
+                                        <p:tav tm="100000">
+                                          <p:val>
+                                            <p:strVal val="#ppt_w"/>
+                                          </p:val>
+                                        </p:tav>
+                                      </p:tavLst>
+                                    </p:anim>
+                                    <p:anim calcmode="lin" valueType="num">
+                                      <p:cBhvr>
+                                        <p:cTn id="15" dur="1000" fill="hold"/>
+                                        <p:tgtEl>
+                                          <p:spTgt spid="9"/>
+                                        </p:tgtEl>
+                                        <p:attrNameLst>
+                                          <p:attrName>ppt_h</p:attrName>
+                                        </p:attrNameLst>
+                                      </p:cBhvr>
+                                      <p:tavLst>
+                                        <p:tav tm="0">
+                                          <p:val>
+                                            <p:fltVal val="0"/>
+                                          </p:val>
+                                        </p:tav>
+                                        <p:tav tm="100000">
+                                          <p:val>
+                                            <p:strVal val="#ppt_h"/>
+                                          </p:val>
+                                        </p:tav>
+                                      </p:tavLst>
+                                    </p:anim>
+                                    <p:anim calcmode="lin" valueType="num">
+                                      <p:cBhvr>
+                                        <p:cTn id="16" dur="1000" fill="hold"/>
+                                        <p:tgtEl>
+                                          <p:spTgt spid="9"/>
+                                        </p:tgtEl>
+                                        <p:attrNameLst>
+                                          <p:attrName>style.rotation</p:attrName>
+                                        </p:attrNameLst>
+                                      </p:cBhvr>
+                                      <p:tavLst>
+                                        <p:tav tm="0">
+                                          <p:val>
+                                            <p:fltVal val="90"/>
+                                          </p:val>
+                                        </p:tav>
+                                        <p:tav tm="100000">
+                                          <p:val>
+                                            <p:fltVal val="0"/>
+                                          </p:val>
+                                        </p:tav>
+                                      </p:tavLst>
+                                    </p:anim>
+                                    <p:animEffect transition="in" filter="fade">
+                                      <p:cBhvr>
+                                        <p:cTn id="17" dur="1000"/>
+                                        <p:tgtEl>
+                                          <p:spTgt spid="9"/>
+                                        </p:tgtEl>
+                                      </p:cBhvr>
+                                    </p:animEffect>
+                                  </p:childTnLst>
+                                </p:cTn>
+                              </p:par>
+                            </p:childTnLst>
+                          </p:cTn>
+                        </p:par>
+                      </p:childTnLst>
+                    </p:cTn>
+                  </p:par>
+                  <p:par>
+                    <p:cTn id="18" fill="hold">
+                      <p:stCondLst>
+                        <p:cond delay="indefinite"/>
+                      </p:stCondLst>
+                      <p:childTnLst>
+                        <p:par>
+                          <p:cTn id="19" fill="hold">
+                            <p:stCondLst>
+                              <p:cond delay="0"/>
+                            </p:stCondLst>
+                            <p:childTnLst>
+                              <p:par>
+                                <p:cTn id="20" presetID="2" presetClass="entr" presetSubtype="4" fill="hold" nodeType="clickEffect">
+                                  <p:stCondLst>
+                                    <p:cond delay="0"/>
+                                  </p:stCondLst>
+                                  <p:childTnLst>
+                                    <p:set>
+                                      <p:cBhvr>
+                                        <p:cTn id="21" dur="1" fill="hold">
+                                          <p:stCondLst>
+                                            <p:cond delay="0"/>
+                                          </p:stCondLst>
+                                        </p:cTn>
+                                        <p:tgtEl>
+                                          <p:spTgt spid="10"/>
+                                        </p:tgtEl>
+                                        <p:attrNameLst>
+                                          <p:attrName>style.visibility</p:attrName>
+                                        </p:attrNameLst>
+                                      </p:cBhvr>
+                                      <p:to>
+                                        <p:strVal val="visible"/>
+                                      </p:to>
+                                    </p:set>
+                                    <p:anim calcmode="lin" valueType="num">
+                                      <p:cBhvr additive="base">
+                                        <p:cTn id="22" dur="500" fill="hold"/>
+                                        <p:tgtEl>
+                                          <p:spTgt spid="10"/>
+                                        </p:tgtEl>
+                                        <p:attrNameLst>
+                                          <p:attrName>ppt_x</p:attrName>
+                                        </p:attrNameLst>
+                                      </p:cBhvr>
+                                      <p:tavLst>
+                                        <p:tav tm="0">
+                                          <p:val>
+                                            <p:strVal val="#ppt_x"/>
+                                          </p:val>
+                                        </p:tav>
+                                        <p:tav tm="100000">
+                                          <p:val>
+                                            <p:strVal val="#ppt_x"/>
+                                          </p:val>
+                                        </p:tav>
+                                      </p:tavLst>
+                                    </p:anim>
+                                    <p:anim calcmode="lin" valueType="num">
+                                      <p:cBhvr additive="base">
+                                        <p:cTn id="23" dur="500" fill="hold"/>
+                                        <p:tgtEl>
+                                          <p:spTgt spid="10"/>
+                                        </p:tgtEl>
+                                        <p:attrNameLst>
+                                          <p:attrName>ppt_y</p:attrName>
+                                        </p:attrNameLst>
+                                      </p:cBhvr>
+                                      <p:tavLst>
+                                        <p:tav tm="0">
+                                          <p:val>
+                                            <p:strVal val="1+#ppt_h/2"/>
+                                          </p:val>
+                                        </p:tav>
+                                        <p:tav tm="100000">
+                                          <p:val>
+                                            <p:strVal val="#ppt_y"/>
+                                          </p:val>
+                                        </p:tav>
+                                      </p:tavLst>
+                                    </p:anim>
+                                  </p:childTnLst>
+                                </p:cTn>
+                              </p:par>
+                            </p:childTnLst>
+                          </p:cTn>
+                        </p:par>
+                      </p:childTnLst>
+                    </p:cTn>
+                  </p:par>
+                  <p:par>
+                    <p:cTn id="24" fill="hold">
+                      <p:stCondLst>
+                        <p:cond delay="indefinite"/>
+                      </p:stCondLst>
+                      <p:childTnLst>
+                        <p:par>
+                          <p:cTn id="25" fill="hold">
+                            <p:stCondLst>
+                              <p:cond delay="0"/>
+                            </p:stCondLst>
+                            <p:childTnLst>
+                              <p:par>
+                                <p:cTn id="26" presetID="42" presetClass="entr" presetSubtype="0" fill="hold" grpId="0" nodeType="clickEffect">
+                                  <p:stCondLst>
+                                    <p:cond delay="0"/>
+                                  </p:stCondLst>
+                                  <p:childTnLst>
+                                    <p:set>
+                                      <p:cBhvr>
+                                        <p:cTn id="27" dur="1" fill="hold">
+                                          <p:stCondLst>
+                                            <p:cond delay="0"/>
+                                          </p:stCondLst>
+                                        </p:cTn>
+                                        <p:tgtEl>
+                                          <p:spTgt spid="6">
+                                            <p:txEl>
+                                              <p:pRg st="0" end="0"/>
+                                            </p:txEl>
+                                          </p:spTgt>
+                                        </p:tgtEl>
+                                        <p:attrNameLst>
+                                          <p:attrName>style.visibility</p:attrName>
+                                        </p:attrNameLst>
+                                      </p:cBhvr>
+                                      <p:to>
+                                        <p:strVal val="visible"/>
+                                      </p:to>
+                                    </p:set>
+                                    <p:animEffect transition="in" filter="fade">
+                                      <p:cBhvr>
+                                        <p:cTn id="28" dur="1000"/>
+                                        <p:tgtEl>
+                                          <p:spTgt spid="6">
+                                            <p:txEl>
+                                              <p:pRg st="0" end="0"/>
+                                            </p:txEl>
+                                          </p:spTgt>
+                                        </p:tgtEl>
+                                      </p:cBhvr>
+                                    </p:animEffect>
+                                    <p:anim calcmode="lin" valueType="num">
+                                      <p:cBhvr>
+                                        <p:cTn id="29" dur="1000" fill="hold"/>
+                                        <p:tgtEl>
+                                          <p:spTgt spid="6">
+                                            <p:txEl>
+                                              <p:pRg st="0" end="0"/>
+                                            </p:txEl>
+                                          </p:spTgt>
+                                        </p:tgtEl>
+                                        <p:attrNameLst>
+                                          <p:attrName>ppt_x</p:attrName>
+                                        </p:attrNameLst>
+                                      </p:cBhvr>
+                                      <p:tavLst>
+                                        <p:tav tm="0">
+                                          <p:val>
+                                            <p:strVal val="#ppt_x"/>
+                                          </p:val>
+                                        </p:tav>
+                                        <p:tav tm="100000">
+                                          <p:val>
+                                            <p:strVal val="#ppt_x"/>
+                                          </p:val>
+                                        </p:tav>
+                                      </p:tavLst>
+                                    </p:anim>
+                                    <p:anim calcmode="lin" valueType="num">
+                                      <p:cBhvr>
+                                        <p:cTn id="30" dur="1000" fill="hold"/>
+                                        <p:tgtEl>
+                                          <p:spTgt spid="6">
+                                            <p:txEl>
+                                              <p:pRg st="0" end="0"/>
+                                            </p:txEl>
+                                          </p:spTgt>
+                                        </p:tgtEl>
+                                        <p:attrNameLst>
+                                          <p:attrName>ppt_y</p:attrName>
+                                        </p:attrNameLst>
+                                      </p:cBhvr>
+                                      <p:tavLst>
+                                        <p:tav tm="0">
+                                          <p:val>
+                                            <p:strVal val="#ppt_y+.1"/>
+                                          </p:val>
+                                        </p:tav>
+                                        <p:tav tm="100000">
+                                          <p:val>
+                                            <p:strVal val="#ppt_y"/>
+                                          </p:val>
+                                        </p:tav>
+                                      </p:tavLst>
+                                    </p:anim>
+                                  </p:childTnLst>
+                                </p:cTn>
+                              </p:par>
+                            </p:childTnLst>
+                          </p:cTn>
+                        </p:par>
+                      </p:childTnLst>
+                    </p:cTn>
+                  </p:par>
+                  <p:par>
+                    <p:cTn id="31" fill="hold">
+                      <p:stCondLst>
+                        <p:cond delay="indefinite"/>
+                      </p:stCondLst>
+                      <p:childTnLst>
+                        <p:par>
+                          <p:cTn id="32" fill="hold">
+                            <p:stCondLst>
+                              <p:cond delay="0"/>
+                            </p:stCondLst>
+                            <p:childTnLst>
+                              <p:par>
+                                <p:cTn id="33" presetID="42" presetClass="entr" presetSubtype="0" fill="hold" grpId="0" nodeType="clickEffect">
+                                  <p:stCondLst>
+                                    <p:cond delay="0"/>
+                                  </p:stCondLst>
+                                  <p:childTnLst>
+                                    <p:set>
+                                      <p:cBhvr>
+                                        <p:cTn id="34" dur="1" fill="hold">
+                                          <p:stCondLst>
+                                            <p:cond delay="0"/>
+                                          </p:stCondLst>
+                                        </p:cTn>
+                                        <p:tgtEl>
+                                          <p:spTgt spid="6">
+                                            <p:txEl>
+                                              <p:pRg st="1" end="1"/>
+                                            </p:txEl>
+                                          </p:spTgt>
+                                        </p:tgtEl>
+                                        <p:attrNameLst>
+                                          <p:attrName>style.visibility</p:attrName>
+                                        </p:attrNameLst>
+                                      </p:cBhvr>
+                                      <p:to>
+                                        <p:strVal val="visible"/>
+                                      </p:to>
+                                    </p:set>
+                                    <p:animEffect transition="in" filter="fade">
+                                      <p:cBhvr>
+                                        <p:cTn id="35" dur="1000"/>
+                                        <p:tgtEl>
+                                          <p:spTgt spid="6">
+                                            <p:txEl>
+                                              <p:pRg st="1" end="1"/>
+                                            </p:txEl>
+                                          </p:spTgt>
+                                        </p:tgtEl>
+                                      </p:cBhvr>
+                                    </p:animEffect>
+                                    <p:anim calcmode="lin" valueType="num">
+                                      <p:cBhvr>
+                                        <p:cTn id="36" dur="1000" fill="hold"/>
+                                        <p:tgtEl>
+                                          <p:spTgt spid="6">
+                                            <p:txEl>
+                                              <p:pRg st="1" end="1"/>
+                                            </p:txEl>
+                                          </p:spTgt>
+                                        </p:tgtEl>
+                                        <p:attrNameLst>
+                                          <p:attrName>ppt_x</p:attrName>
+                                        </p:attrNameLst>
+                                      </p:cBhvr>
+                                      <p:tavLst>
+                                        <p:tav tm="0">
+                                          <p:val>
+                                            <p:strVal val="#ppt_x"/>
+                                          </p:val>
+                                        </p:tav>
+                                        <p:tav tm="100000">
+                                          <p:val>
+                                            <p:strVal val="#ppt_x"/>
+                                          </p:val>
+                                        </p:tav>
+                                      </p:tavLst>
+                                    </p:anim>
+                                    <p:anim calcmode="lin" valueType="num">
+                                      <p:cBhvr>
+                                        <p:cTn id="37" dur="1000" fill="hold"/>
+                                        <p:tgtEl>
+                                          <p:spTgt spid="6">
+                                            <p:txEl>
+                                              <p:pRg st="1" end="1"/>
+                                            </p:txEl>
+                                          </p:spTgt>
+                                        </p:tgtEl>
+                                        <p:attrNameLst>
+                                          <p:attrName>ppt_y</p:attrName>
+                                        </p:attrNameLst>
+                                      </p:cBhvr>
+                                      <p:tavLst>
+                                        <p:tav tm="0">
+                                          <p:val>
+                                            <p:strVal val="#ppt_y+.1"/>
+                                          </p:val>
+                                        </p:tav>
+                                        <p:tav tm="100000">
+                                          <p:val>
+                                            <p:strVal val="#ppt_y"/>
+                                          </p:val>
+                                        </p:tav>
+                                      </p:tavLst>
+                                    </p:anim>
+                                  </p:childTnLst>
+                                </p:cTn>
+                              </p:par>
+                            </p:childTnLst>
+                          </p:cTn>
+                        </p:par>
+                      </p:childTnLst>
+                    </p:cTn>
+                  </p:par>
+                </p:childTnLst>
+              </p:cTn>
+              <p:prevCondLst>
+                <p:cond evt="onPrev" delay="0">
+                  <p:tgtEl>
+                    <p:sldTgt/>
+                  </p:tgtEl>
+                </p:cond>
+              </p:prevCondLst>
+              <p:nextCondLst>
+                <p:cond evt="onNext" delay="0">
+                  <p:tgtEl>
+                    <p:sldTgt/>
+                  </p:tgtEl>
+                </p:cond>
+              </p:nextCondLst>
+            </p:seq>
+          </p:childTnLst>
+        </p:cTn>
+      </p:par>
+    </p:tnLst>
+    <p:bldLst>
+      <p:bldP spid="6" grpId="0" build="p"/>
+    </p:bldLst>
+  </p:timing>
+</p:sld>
+</file>
+
+<file path=ppt/slides/slide7.xml><?xml version="1.0" encoding="utf-8"?>
+<p:sld xmlns:a="http://schemas.openxmlformats.org/drawingml/2006/main" xmlns:r="http://schemas.openxmlformats.org/officeDocument/2006/relationships" xmlns:p="http://schemas.openxmlformats.org/presentationml/2006/main">
+  <p:cSld>
+    <p:spTree>
+      <p:nvGrpSpPr>
+        <p:cNvPr id="1" name=""/>
+        <p:cNvGrpSpPr/>
+        <p:nvPr/>
+      </p:nvGrpSpPr>
+      <p:grpSpPr>
+        <a:xfrm>
+          <a:off x="0" y="0"/>
+          <a:ext cx="0" cy="0"/>
+          <a:chOff x="0" y="0"/>
+          <a:chExt cx="0" cy="0"/>
+        </a:xfrm>
+      </p:grpSpPr>
+      <p:pic>
+        <p:nvPicPr>
           <p:cNvPr id="4" name="Picture 3"/>
           <p:cNvPicPr>
             <a:picLocks noChangeAspect="1"/>
@@ -11549,7 +13177,7 @@
 </p:sld>
 </file>
 
-<file path=ppt/slides/slide7.xml><?xml version="1.0" encoding="utf-8"?>
+<file path=ppt/slides/slide8.xml><?xml version="1.0" encoding="utf-8"?>
 <p:sld xmlns:a="http://schemas.openxmlformats.org/drawingml/2006/main" xmlns:r="http://schemas.openxmlformats.org/officeDocument/2006/relationships" xmlns:p="http://schemas.openxmlformats.org/presentationml/2006/main">
   <p:cSld>
     <p:spTree>
@@ -13218,7 +14846,7 @@
 </p:sld>
 </file>
 
-<file path=ppt/slides/slide8.xml><?xml version="1.0" encoding="utf-8"?>
+<file path=ppt/slides/slide9.xml><?xml version="1.0" encoding="utf-8"?>
 <p:sld xmlns:a="http://schemas.openxmlformats.org/drawingml/2006/main" xmlns:r="http://schemas.openxmlformats.org/officeDocument/2006/relationships" xmlns:p="http://schemas.openxmlformats.org/presentationml/2006/main">
   <p:cSld>
     <p:spTree>
@@ -13663,622 +15291,6 @@
                                           <p:spTgt spid="3">
                                             <p:txEl>
                                               <p:pRg st="2" end="2"/>
-                                            </p:txEl>
-                                          </p:spTgt>
-                                        </p:tgtEl>
-                                        <p:attrNameLst>
-                                          <p:attrName>ppt_y</p:attrName>
-                                        </p:attrNameLst>
-                                      </p:cBhvr>
-                                      <p:tavLst>
-                                        <p:tav tm="0">
-                                          <p:val>
-                                            <p:strVal val="#ppt_y+.1"/>
-                                          </p:val>
-                                        </p:tav>
-                                        <p:tav tm="100000">
-                                          <p:val>
-                                            <p:strVal val="#ppt_y"/>
-                                          </p:val>
-                                        </p:tav>
-                                      </p:tavLst>
-                                    </p:anim>
-                                  </p:childTnLst>
-                                </p:cTn>
-                              </p:par>
-                            </p:childTnLst>
-                          </p:cTn>
-                        </p:par>
-                      </p:childTnLst>
-                    </p:cTn>
-                  </p:par>
-                </p:childTnLst>
-              </p:cTn>
-              <p:prevCondLst>
-                <p:cond evt="onPrev" delay="0">
-                  <p:tgtEl>
-                    <p:sldTgt/>
-                  </p:tgtEl>
-                </p:cond>
-              </p:prevCondLst>
-              <p:nextCondLst>
-                <p:cond evt="onNext" delay="0">
-                  <p:tgtEl>
-                    <p:sldTgt/>
-                  </p:tgtEl>
-                </p:cond>
-              </p:nextCondLst>
-            </p:seq>
-          </p:childTnLst>
-        </p:cTn>
-      </p:par>
-    </p:tnLst>
-    <p:bldLst>
-      <p:bldP spid="3" grpId="0" build="p"/>
-    </p:bldLst>
-  </p:timing>
-</p:sld>
-</file>
-
-<file path=ppt/slides/slide9.xml><?xml version="1.0" encoding="utf-8"?>
-<p:sld xmlns:a="http://schemas.openxmlformats.org/drawingml/2006/main" xmlns:r="http://schemas.openxmlformats.org/officeDocument/2006/relationships" xmlns:p="http://schemas.openxmlformats.org/presentationml/2006/main">
-  <p:cSld>
-    <p:spTree>
-      <p:nvGrpSpPr>
-        <p:cNvPr id="1" name=""/>
-        <p:cNvGrpSpPr/>
-        <p:nvPr/>
-      </p:nvGrpSpPr>
-      <p:grpSpPr>
-        <a:xfrm>
-          <a:off x="0" y="0"/>
-          <a:ext cx="0" cy="0"/>
-          <a:chOff x="0" y="0"/>
-          <a:chExt cx="0" cy="0"/>
-        </a:xfrm>
-      </p:grpSpPr>
-      <p:sp>
-        <p:nvSpPr>
-          <p:cNvPr id="2" name="Title 1"/>
-          <p:cNvSpPr>
-            <a:spLocks noGrp="1"/>
-          </p:cNvSpPr>
-          <p:nvPr>
-            <p:ph type="title"/>
-          </p:nvPr>
-        </p:nvSpPr>
-        <p:spPr/>
-        <p:txBody>
-          <a:bodyPr>
-            <a:normAutofit/>
-          </a:bodyPr>
-          <a:lstStyle/>
-          <a:p>
-            <a:r>
-              <a:rPr lang="en-IN" sz="5400" dirty="0" smtClean="0"/>
-              <a:t>Search Relief </a:t>
-            </a:r>
-            <a:r>
-              <a:rPr lang="en-IN" sz="5400" dirty="0" err="1" smtClean="0"/>
-              <a:t>Centers</a:t>
-            </a:r>
-            <a:endParaRPr lang="en-IN" sz="5400" dirty="0"/>
-          </a:p>
-        </p:txBody>
-      </p:sp>
-      <p:sp>
-        <p:nvSpPr>
-          <p:cNvPr id="3" name="Content Placeholder 2"/>
-          <p:cNvSpPr>
-            <a:spLocks noGrp="1"/>
-          </p:cNvSpPr>
-          <p:nvPr>
-            <p:ph idx="1"/>
-          </p:nvPr>
-        </p:nvSpPr>
-        <p:spPr/>
-        <p:txBody>
-          <a:bodyPr/>
-          <a:lstStyle/>
-          <a:p>
-            <a:r>
-              <a:rPr lang="en-IN" sz="2800" dirty="0" smtClean="0"/>
-              <a:t>Struck somewhere in Disaster hit area ? Don’t know where to go? Check out Relief </a:t>
-            </a:r>
-            <a:r>
-              <a:rPr lang="en-IN" sz="2800" dirty="0" err="1" smtClean="0"/>
-              <a:t>Centers</a:t>
-            </a:r>
-            <a:r>
-              <a:rPr lang="en-IN" sz="2800" dirty="0" smtClean="0"/>
-              <a:t> Nearby</a:t>
-            </a:r>
-          </a:p>
-          <a:p>
-            <a:r>
-              <a:rPr lang="en-IN" sz="2800" dirty="0" smtClean="0"/>
-              <a:t>There are many people who are ready to help you, we have them listed for you. Avail the help.</a:t>
-            </a:r>
-          </a:p>
-          <a:p>
-            <a:r>
-              <a:rPr lang="en-IN" sz="2800" dirty="0" smtClean="0"/>
-              <a:t>Get Safe..</a:t>
-            </a:r>
-          </a:p>
-          <a:p>
-            <a:pPr marL="0" indent="0">
-              <a:buNone/>
-            </a:pPr>
-            <a:r>
-              <a:rPr lang="en-IN" dirty="0" smtClean="0"/>
-              <a:t>				</a:t>
-            </a:r>
-            <a:endParaRPr lang="en-IN" dirty="0"/>
-          </a:p>
-        </p:txBody>
-      </p:sp>
-    </p:spTree>
-    <p:extLst>
-      <p:ext uri="{BB962C8B-B14F-4D97-AF65-F5344CB8AC3E}">
-        <p14:creationId xmlns:p14="http://schemas.microsoft.com/office/powerpoint/2010/main" val="3433766443"/>
-      </p:ext>
-    </p:extLst>
-  </p:cSld>
-  <p:clrMapOvr>
-    <a:masterClrMapping/>
-  </p:clrMapOvr>
-  <mc:AlternateContent xmlns:mc="http://schemas.openxmlformats.org/markup-compatibility/2006" xmlns:p14="http://schemas.microsoft.com/office/powerpoint/2010/main">
-    <mc:Choice Requires="p14">
-      <p:transition spd="slow" p14:dur="1300">
-        <p14:pan dir="u"/>
-      </p:transition>
-    </mc:Choice>
-    <mc:Fallback xmlns="">
-      <p:transition spd="slow">
-        <p:fade/>
-      </p:transition>
-    </mc:Fallback>
-  </mc:AlternateContent>
-  <p:timing>
-    <p:tnLst>
-      <p:par>
-        <p:cTn id="1" dur="indefinite" restart="never" nodeType="tmRoot">
-          <p:childTnLst>
-            <p:seq concurrent="1" nextAc="seek">
-              <p:cTn id="2" dur="indefinite" nodeType="mainSeq">
-                <p:childTnLst>
-                  <p:par>
-                    <p:cTn id="3" fill="hold">
-                      <p:stCondLst>
-                        <p:cond delay="indefinite"/>
-                      </p:stCondLst>
-                      <p:childTnLst>
-                        <p:par>
-                          <p:cTn id="4" fill="hold">
-                            <p:stCondLst>
-                              <p:cond delay="0"/>
-                            </p:stCondLst>
-                            <p:childTnLst>
-                              <p:par>
-                                <p:cTn id="5" presetID="42" presetClass="entr" presetSubtype="0" fill="hold" grpId="0" nodeType="clickEffect">
-                                  <p:stCondLst>
-                                    <p:cond delay="0"/>
-                                  </p:stCondLst>
-                                  <p:childTnLst>
-                                    <p:set>
-                                      <p:cBhvr>
-                                        <p:cTn id="6" dur="1" fill="hold">
-                                          <p:stCondLst>
-                                            <p:cond delay="0"/>
-                                          </p:stCondLst>
-                                        </p:cTn>
-                                        <p:tgtEl>
-                                          <p:spTgt spid="3">
-                                            <p:txEl>
-                                              <p:pRg st="0" end="0"/>
-                                            </p:txEl>
-                                          </p:spTgt>
-                                        </p:tgtEl>
-                                        <p:attrNameLst>
-                                          <p:attrName>style.visibility</p:attrName>
-                                        </p:attrNameLst>
-                                      </p:cBhvr>
-                                      <p:to>
-                                        <p:strVal val="visible"/>
-                                      </p:to>
-                                    </p:set>
-                                    <p:animEffect transition="in" filter="fade">
-                                      <p:cBhvr>
-                                        <p:cTn id="7" dur="1000"/>
-                                        <p:tgtEl>
-                                          <p:spTgt spid="3">
-                                            <p:txEl>
-                                              <p:pRg st="0" end="0"/>
-                                            </p:txEl>
-                                          </p:spTgt>
-                                        </p:tgtEl>
-                                      </p:cBhvr>
-                                    </p:animEffect>
-                                    <p:anim calcmode="lin" valueType="num">
-                                      <p:cBhvr>
-                                        <p:cTn id="8" dur="1000" fill="hold"/>
-                                        <p:tgtEl>
-                                          <p:spTgt spid="3">
-                                            <p:txEl>
-                                              <p:pRg st="0" end="0"/>
-                                            </p:txEl>
-                                          </p:spTgt>
-                                        </p:tgtEl>
-                                        <p:attrNameLst>
-                                          <p:attrName>ppt_x</p:attrName>
-                                        </p:attrNameLst>
-                                      </p:cBhvr>
-                                      <p:tavLst>
-                                        <p:tav tm="0">
-                                          <p:val>
-                                            <p:strVal val="#ppt_x"/>
-                                          </p:val>
-                                        </p:tav>
-                                        <p:tav tm="100000">
-                                          <p:val>
-                                            <p:strVal val="#ppt_x"/>
-                                          </p:val>
-                                        </p:tav>
-                                      </p:tavLst>
-                                    </p:anim>
-                                    <p:anim calcmode="lin" valueType="num">
-                                      <p:cBhvr>
-                                        <p:cTn id="9" dur="1000" fill="hold"/>
-                                        <p:tgtEl>
-                                          <p:spTgt spid="3">
-                                            <p:txEl>
-                                              <p:pRg st="0" end="0"/>
-                                            </p:txEl>
-                                          </p:spTgt>
-                                        </p:tgtEl>
-                                        <p:attrNameLst>
-                                          <p:attrName>ppt_y</p:attrName>
-                                        </p:attrNameLst>
-                                      </p:cBhvr>
-                                      <p:tavLst>
-                                        <p:tav tm="0">
-                                          <p:val>
-                                            <p:strVal val="#ppt_y+.1"/>
-                                          </p:val>
-                                        </p:tav>
-                                        <p:tav tm="100000">
-                                          <p:val>
-                                            <p:strVal val="#ppt_y"/>
-                                          </p:val>
-                                        </p:tav>
-                                      </p:tavLst>
-                                    </p:anim>
-                                  </p:childTnLst>
-                                </p:cTn>
-                              </p:par>
-                            </p:childTnLst>
-                          </p:cTn>
-                        </p:par>
-                      </p:childTnLst>
-                    </p:cTn>
-                  </p:par>
-                  <p:par>
-                    <p:cTn id="10" fill="hold">
-                      <p:stCondLst>
-                        <p:cond delay="indefinite"/>
-                      </p:stCondLst>
-                      <p:childTnLst>
-                        <p:par>
-                          <p:cTn id="11" fill="hold">
-                            <p:stCondLst>
-                              <p:cond delay="0"/>
-                            </p:stCondLst>
-                            <p:childTnLst>
-                              <p:par>
-                                <p:cTn id="12" presetID="42" presetClass="entr" presetSubtype="0" fill="hold" grpId="0" nodeType="clickEffect">
-                                  <p:stCondLst>
-                                    <p:cond delay="0"/>
-                                  </p:stCondLst>
-                                  <p:childTnLst>
-                                    <p:set>
-                                      <p:cBhvr>
-                                        <p:cTn id="13" dur="1" fill="hold">
-                                          <p:stCondLst>
-                                            <p:cond delay="0"/>
-                                          </p:stCondLst>
-                                        </p:cTn>
-                                        <p:tgtEl>
-                                          <p:spTgt spid="3">
-                                            <p:txEl>
-                                              <p:pRg st="1" end="1"/>
-                                            </p:txEl>
-                                          </p:spTgt>
-                                        </p:tgtEl>
-                                        <p:attrNameLst>
-                                          <p:attrName>style.visibility</p:attrName>
-                                        </p:attrNameLst>
-                                      </p:cBhvr>
-                                      <p:to>
-                                        <p:strVal val="visible"/>
-                                      </p:to>
-                                    </p:set>
-                                    <p:animEffect transition="in" filter="fade">
-                                      <p:cBhvr>
-                                        <p:cTn id="14" dur="1000"/>
-                                        <p:tgtEl>
-                                          <p:spTgt spid="3">
-                                            <p:txEl>
-                                              <p:pRg st="1" end="1"/>
-                                            </p:txEl>
-                                          </p:spTgt>
-                                        </p:tgtEl>
-                                      </p:cBhvr>
-                                    </p:animEffect>
-                                    <p:anim calcmode="lin" valueType="num">
-                                      <p:cBhvr>
-                                        <p:cTn id="15" dur="1000" fill="hold"/>
-                                        <p:tgtEl>
-                                          <p:spTgt spid="3">
-                                            <p:txEl>
-                                              <p:pRg st="1" end="1"/>
-                                            </p:txEl>
-                                          </p:spTgt>
-                                        </p:tgtEl>
-                                        <p:attrNameLst>
-                                          <p:attrName>ppt_x</p:attrName>
-                                        </p:attrNameLst>
-                                      </p:cBhvr>
-                                      <p:tavLst>
-                                        <p:tav tm="0">
-                                          <p:val>
-                                            <p:strVal val="#ppt_x"/>
-                                          </p:val>
-                                        </p:tav>
-                                        <p:tav tm="100000">
-                                          <p:val>
-                                            <p:strVal val="#ppt_x"/>
-                                          </p:val>
-                                        </p:tav>
-                                      </p:tavLst>
-                                    </p:anim>
-                                    <p:anim calcmode="lin" valueType="num">
-                                      <p:cBhvr>
-                                        <p:cTn id="16" dur="1000" fill="hold"/>
-                                        <p:tgtEl>
-                                          <p:spTgt spid="3">
-                                            <p:txEl>
-                                              <p:pRg st="1" end="1"/>
-                                            </p:txEl>
-                                          </p:spTgt>
-                                        </p:tgtEl>
-                                        <p:attrNameLst>
-                                          <p:attrName>ppt_y</p:attrName>
-                                        </p:attrNameLst>
-                                      </p:cBhvr>
-                                      <p:tavLst>
-                                        <p:tav tm="0">
-                                          <p:val>
-                                            <p:strVal val="#ppt_y+.1"/>
-                                          </p:val>
-                                        </p:tav>
-                                        <p:tav tm="100000">
-                                          <p:val>
-                                            <p:strVal val="#ppt_y"/>
-                                          </p:val>
-                                        </p:tav>
-                                      </p:tavLst>
-                                    </p:anim>
-                                  </p:childTnLst>
-                                </p:cTn>
-                              </p:par>
-                            </p:childTnLst>
-                          </p:cTn>
-                        </p:par>
-                      </p:childTnLst>
-                    </p:cTn>
-                  </p:par>
-                  <p:par>
-                    <p:cTn id="17" fill="hold">
-                      <p:stCondLst>
-                        <p:cond delay="indefinite"/>
-                      </p:stCondLst>
-                      <p:childTnLst>
-                        <p:par>
-                          <p:cTn id="18" fill="hold">
-                            <p:stCondLst>
-                              <p:cond delay="0"/>
-                            </p:stCondLst>
-                            <p:childTnLst>
-                              <p:par>
-                                <p:cTn id="19" presetID="42" presetClass="entr" presetSubtype="0" fill="hold" grpId="0" nodeType="clickEffect">
-                                  <p:stCondLst>
-                                    <p:cond delay="0"/>
-                                  </p:stCondLst>
-                                  <p:childTnLst>
-                                    <p:set>
-                                      <p:cBhvr>
-                                        <p:cTn id="20" dur="1" fill="hold">
-                                          <p:stCondLst>
-                                            <p:cond delay="0"/>
-                                          </p:stCondLst>
-                                        </p:cTn>
-                                        <p:tgtEl>
-                                          <p:spTgt spid="3">
-                                            <p:txEl>
-                                              <p:pRg st="2" end="2"/>
-                                            </p:txEl>
-                                          </p:spTgt>
-                                        </p:tgtEl>
-                                        <p:attrNameLst>
-                                          <p:attrName>style.visibility</p:attrName>
-                                        </p:attrNameLst>
-                                      </p:cBhvr>
-                                      <p:to>
-                                        <p:strVal val="visible"/>
-                                      </p:to>
-                                    </p:set>
-                                    <p:animEffect transition="in" filter="fade">
-                                      <p:cBhvr>
-                                        <p:cTn id="21" dur="1000"/>
-                                        <p:tgtEl>
-                                          <p:spTgt spid="3">
-                                            <p:txEl>
-                                              <p:pRg st="2" end="2"/>
-                                            </p:txEl>
-                                          </p:spTgt>
-                                        </p:tgtEl>
-                                      </p:cBhvr>
-                                    </p:animEffect>
-                                    <p:anim calcmode="lin" valueType="num">
-                                      <p:cBhvr>
-                                        <p:cTn id="22" dur="1000" fill="hold"/>
-                                        <p:tgtEl>
-                                          <p:spTgt spid="3">
-                                            <p:txEl>
-                                              <p:pRg st="2" end="2"/>
-                                            </p:txEl>
-                                          </p:spTgt>
-                                        </p:tgtEl>
-                                        <p:attrNameLst>
-                                          <p:attrName>ppt_x</p:attrName>
-                                        </p:attrNameLst>
-                                      </p:cBhvr>
-                                      <p:tavLst>
-                                        <p:tav tm="0">
-                                          <p:val>
-                                            <p:strVal val="#ppt_x"/>
-                                          </p:val>
-                                        </p:tav>
-                                        <p:tav tm="100000">
-                                          <p:val>
-                                            <p:strVal val="#ppt_x"/>
-                                          </p:val>
-                                        </p:tav>
-                                      </p:tavLst>
-                                    </p:anim>
-                                    <p:anim calcmode="lin" valueType="num">
-                                      <p:cBhvr>
-                                        <p:cTn id="23" dur="1000" fill="hold"/>
-                                        <p:tgtEl>
-                                          <p:spTgt spid="3">
-                                            <p:txEl>
-                                              <p:pRg st="2" end="2"/>
-                                            </p:txEl>
-                                          </p:spTgt>
-                                        </p:tgtEl>
-                                        <p:attrNameLst>
-                                          <p:attrName>ppt_y</p:attrName>
-                                        </p:attrNameLst>
-                                      </p:cBhvr>
-                                      <p:tavLst>
-                                        <p:tav tm="0">
-                                          <p:val>
-                                            <p:strVal val="#ppt_y+.1"/>
-                                          </p:val>
-                                        </p:tav>
-                                        <p:tav tm="100000">
-                                          <p:val>
-                                            <p:strVal val="#ppt_y"/>
-                                          </p:val>
-                                        </p:tav>
-                                      </p:tavLst>
-                                    </p:anim>
-                                  </p:childTnLst>
-                                </p:cTn>
-                              </p:par>
-                            </p:childTnLst>
-                          </p:cTn>
-                        </p:par>
-                      </p:childTnLst>
-                    </p:cTn>
-                  </p:par>
-                  <p:par>
-                    <p:cTn id="24" fill="hold">
-                      <p:stCondLst>
-                        <p:cond delay="indefinite"/>
-                      </p:stCondLst>
-                      <p:childTnLst>
-                        <p:par>
-                          <p:cTn id="25" fill="hold">
-                            <p:stCondLst>
-                              <p:cond delay="0"/>
-                            </p:stCondLst>
-                            <p:childTnLst>
-                              <p:par>
-                                <p:cTn id="26" presetID="42" presetClass="entr" presetSubtype="0" fill="hold" grpId="0" nodeType="clickEffect">
-                                  <p:stCondLst>
-                                    <p:cond delay="0"/>
-                                  </p:stCondLst>
-                                  <p:childTnLst>
-                                    <p:set>
-                                      <p:cBhvr>
-                                        <p:cTn id="27" dur="1" fill="hold">
-                                          <p:stCondLst>
-                                            <p:cond delay="0"/>
-                                          </p:stCondLst>
-                                        </p:cTn>
-                                        <p:tgtEl>
-                                          <p:spTgt spid="3">
-                                            <p:txEl>
-                                              <p:pRg st="3" end="3"/>
-                                            </p:txEl>
-                                          </p:spTgt>
-                                        </p:tgtEl>
-                                        <p:attrNameLst>
-                                          <p:attrName>style.visibility</p:attrName>
-                                        </p:attrNameLst>
-                                      </p:cBhvr>
-                                      <p:to>
-                                        <p:strVal val="visible"/>
-                                      </p:to>
-                                    </p:set>
-                                    <p:animEffect transition="in" filter="fade">
-                                      <p:cBhvr>
-                                        <p:cTn id="28" dur="1000"/>
-                                        <p:tgtEl>
-                                          <p:spTgt spid="3">
-                                            <p:txEl>
-                                              <p:pRg st="3" end="3"/>
-                                            </p:txEl>
-                                          </p:spTgt>
-                                        </p:tgtEl>
-                                      </p:cBhvr>
-                                    </p:animEffect>
-                                    <p:anim calcmode="lin" valueType="num">
-                                      <p:cBhvr>
-                                        <p:cTn id="29" dur="1000" fill="hold"/>
-                                        <p:tgtEl>
-                                          <p:spTgt spid="3">
-                                            <p:txEl>
-                                              <p:pRg st="3" end="3"/>
-                                            </p:txEl>
-                                          </p:spTgt>
-                                        </p:tgtEl>
-                                        <p:attrNameLst>
-                                          <p:attrName>ppt_x</p:attrName>
-                                        </p:attrNameLst>
-                                      </p:cBhvr>
-                                      <p:tavLst>
-                                        <p:tav tm="0">
-                                          <p:val>
-                                            <p:strVal val="#ppt_x"/>
-                                          </p:val>
-                                        </p:tav>
-                                        <p:tav tm="100000">
-                                          <p:val>
-                                            <p:strVal val="#ppt_x"/>
-                                          </p:val>
-                                        </p:tav>
-                                      </p:tavLst>
-                                    </p:anim>
-                                    <p:anim calcmode="lin" valueType="num">
-                                      <p:cBhvr>
-                                        <p:cTn id="30" dur="1000" fill="hold"/>
-                                        <p:tgtEl>
-                                          <p:spTgt spid="3">
-                                            <p:txEl>
-                                              <p:pRg st="3" end="3"/>
                                             </p:txEl>
                                           </p:spTgt>
                                         </p:tgtEl>

</xml_diff>